<commit_message>
getting closer to the story
</commit_message>
<xml_diff>
--- a/idw-2015/Content Matters-Open Authoring and Collaboration Across Disciplines.pptx
+++ b/idw-2015/Content Matters-Open Authoring and Collaboration Across Disciplines.pptx
@@ -5,10 +5,10 @@
     <p:sldMasterId id="2147484229" r:id="rId4"/>
   </p:sldMasterIdLst>
   <p:notesMasterIdLst>
-    <p:notesMasterId r:id="rId31"/>
+    <p:notesMasterId r:id="rId34"/>
   </p:notesMasterIdLst>
   <p:handoutMasterIdLst>
-    <p:handoutMasterId r:id="rId32"/>
+    <p:handoutMasterId r:id="rId35"/>
   </p:handoutMasterIdLst>
   <p:sldIdLst>
     <p:sldId id="1332" r:id="rId5"/>
@@ -26,17 +26,20 @@
     <p:sldId id="1330" r:id="rId17"/>
     <p:sldId id="1322" r:id="rId18"/>
     <p:sldId id="1347" r:id="rId19"/>
-    <p:sldId id="1344" r:id="rId20"/>
-    <p:sldId id="1351" r:id="rId21"/>
-    <p:sldId id="1350" r:id="rId22"/>
-    <p:sldId id="1349" r:id="rId23"/>
-    <p:sldId id="1345" r:id="rId24"/>
-    <p:sldId id="1346" r:id="rId25"/>
-    <p:sldId id="1352" r:id="rId26"/>
-    <p:sldId id="1323" r:id="rId27"/>
-    <p:sldId id="1324" r:id="rId28"/>
-    <p:sldId id="1325" r:id="rId29"/>
-    <p:sldId id="1326" r:id="rId30"/>
+    <p:sldId id="1355" r:id="rId20"/>
+    <p:sldId id="1353" r:id="rId21"/>
+    <p:sldId id="1354" r:id="rId22"/>
+    <p:sldId id="1357" r:id="rId23"/>
+    <p:sldId id="1344" r:id="rId24"/>
+    <p:sldId id="1351" r:id="rId25"/>
+    <p:sldId id="1350" r:id="rId26"/>
+    <p:sldId id="1345" r:id="rId27"/>
+    <p:sldId id="1346" r:id="rId28"/>
+    <p:sldId id="1352" r:id="rId29"/>
+    <p:sldId id="1323" r:id="rId30"/>
+    <p:sldId id="1324" r:id="rId31"/>
+    <p:sldId id="1325" r:id="rId32"/>
+    <p:sldId id="1326" r:id="rId33"/>
   </p:sldIdLst>
   <p:sldSz cx="12436475" cy="6994525"/>
   <p:notesSz cx="6858000" cy="9144000"/>
@@ -155,10 +158,13 @@
             <p14:sldId id="1330"/>
             <p14:sldId id="1322"/>
             <p14:sldId id="1347"/>
+            <p14:sldId id="1355"/>
+            <p14:sldId id="1353"/>
+            <p14:sldId id="1354"/>
+            <p14:sldId id="1357"/>
             <p14:sldId id="1344"/>
             <p14:sldId id="1351"/>
             <p14:sldId id="1350"/>
-            <p14:sldId id="1349"/>
             <p14:sldId id="1345"/>
             <p14:sldId id="1346"/>
             <p14:sldId id="1352"/>
@@ -1147,9 +1153,9 @@
           <a:bodyPr/>
           <a:lstStyle/>
           <a:p>
-            <a:fld id="{7D10C09F-FCA1-48C8-B40D-42E1045D109E}" type="datetime8">
+            <a:fld id="{90EC29EE-A8AD-4CE0-9C0B-116E0D4D7533}" type="datetime8">
               <a:rPr lang="en-US" smtClean="0"/>
-              <a:t>9/28/15 1:45 PM</a:t>
+              <a:t>9/28/15 7:04 PM</a:t>
             </a:fld>
             <a:endParaRPr lang="en-US" dirty="0"/>
           </a:p>
@@ -1173,7 +1179,7 @@
             <a:fld id="{B4008EB6-D09E-4580-8CD6-DDB14511944F}" type="slidenum">
               <a:rPr lang="en-US" smtClean="0"/>
               <a:pPr/>
-              <a:t>20</a:t>
+              <a:t>19</a:t>
             </a:fld>
             <a:endParaRPr lang="en-US" dirty="0"/>
           </a:p>
@@ -1182,7 +1188,7 @@
     </p:spTree>
     <p:extLst>
       <p:ext uri="{BB962C8B-B14F-4D97-AF65-F5344CB8AC3E}">
-        <p14:creationId xmlns:p14="http://schemas.microsoft.com/office/powerpoint/2010/main" val="1842705465"/>
+        <p14:creationId xmlns:p14="http://schemas.microsoft.com/office/powerpoint/2010/main" val="677810072"/>
       </p:ext>
     </p:extLst>
   </p:cSld>
@@ -1354,7 +1360,7 @@
             <a:fld id="{B4008EB6-D09E-4580-8CD6-DDB14511944F}" type="slidenum">
               <a:rPr lang="en-US" smtClean="0"/>
               <a:pPr/>
-              <a:t>21</a:t>
+              <a:t>20</a:t>
             </a:fld>
             <a:endParaRPr lang="en-US" dirty="0"/>
           </a:p>
@@ -1363,7 +1369,7 @@
     </p:spTree>
     <p:extLst>
       <p:ext uri="{BB962C8B-B14F-4D97-AF65-F5344CB8AC3E}">
-        <p14:creationId xmlns:p14="http://schemas.microsoft.com/office/powerpoint/2010/main" val="1271038713"/>
+        <p14:creationId xmlns:p14="http://schemas.microsoft.com/office/powerpoint/2010/main" val="1662190510"/>
       </p:ext>
     </p:extLst>
   </p:cSld>
@@ -1511,7 +1517,7 @@
           <a:p>
             <a:fld id="{90EC29EE-A8AD-4CE0-9C0B-116E0D4D7533}" type="datetime8">
               <a:rPr lang="en-US" smtClean="0"/>
-              <a:t>9/28/15 5:20 PM</a:t>
+              <a:t>9/28/15 5:17 PM</a:t>
             </a:fld>
             <a:endParaRPr lang="en-US" dirty="0"/>
           </a:p>
@@ -1535,7 +1541,7 @@
             <a:fld id="{B4008EB6-D09E-4580-8CD6-DDB14511944F}" type="slidenum">
               <a:rPr lang="en-US" smtClean="0"/>
               <a:pPr/>
-              <a:t>22</a:t>
+              <a:t>21</a:t>
             </a:fld>
             <a:endParaRPr lang="en-US" dirty="0"/>
           </a:p>
@@ -1544,7 +1550,7 @@
     </p:spTree>
     <p:extLst>
       <p:ext uri="{BB962C8B-B14F-4D97-AF65-F5344CB8AC3E}">
-        <p14:creationId xmlns:p14="http://schemas.microsoft.com/office/powerpoint/2010/main" val="405178554"/>
+        <p14:creationId xmlns:p14="http://schemas.microsoft.com/office/powerpoint/2010/main" val="50118722"/>
       </p:ext>
     </p:extLst>
   </p:cSld>
@@ -1690,9 +1696,9 @@
           <a:bodyPr/>
           <a:lstStyle/>
           <a:p>
-            <a:fld id="{23A5C127-CB05-47B6-8D1E-7BC74A68F508}" type="datetime8">
+            <a:fld id="{90EC29EE-A8AD-4CE0-9C0B-116E0D4D7533}" type="datetime8">
               <a:rPr lang="en-US" smtClean="0"/>
-              <a:t>9/28/15 1:26 PM</a:t>
+              <a:t>9/28/15 4:58 PM</a:t>
             </a:fld>
             <a:endParaRPr lang="en-US" dirty="0"/>
           </a:p>
@@ -1716,7 +1722,7 @@
             <a:fld id="{B4008EB6-D09E-4580-8CD6-DDB14511944F}" type="slidenum">
               <a:rPr lang="en-US" smtClean="0"/>
               <a:pPr/>
-              <a:t>23</a:t>
+              <a:t>22</a:t>
             </a:fld>
             <a:endParaRPr lang="en-US" dirty="0"/>
           </a:p>
@@ -1725,7 +1731,7 @@
     </p:spTree>
     <p:extLst>
       <p:ext uri="{BB962C8B-B14F-4D97-AF65-F5344CB8AC3E}">
-        <p14:creationId xmlns:p14="http://schemas.microsoft.com/office/powerpoint/2010/main" val="305656114"/>
+        <p14:creationId xmlns:p14="http://schemas.microsoft.com/office/powerpoint/2010/main" val="309300845"/>
       </p:ext>
     </p:extLst>
   </p:cSld>
@@ -1785,12 +1791,12 @@
       </p:sp>
       <p:sp>
         <p:nvSpPr>
-          <p:cNvPr id="6" name="Slide Number Placeholder 5"/>
+          <p:cNvPr id="4" name="Header Placeholder 3"/>
           <p:cNvSpPr>
             <a:spLocks noGrp="1"/>
           </p:cNvSpPr>
           <p:nvPr>
-            <p:ph type="sldNum" sz="quarter" idx="12"/>
+            <p:ph type="hdr" sz="quarter" idx="10"/>
           </p:nvPr>
         </p:nvSpPr>
         <p:spPr/>
@@ -1798,46 +1804,18 @@
           <a:bodyPr/>
           <a:lstStyle/>
           <a:p>
-            <a:fld id="{B4008EB6-D09E-4580-8CD6-DDB14511944F}" type="slidenum">
-              <a:rPr lang="en-US" smtClean="0"/>
-              <a:pPr/>
-              <a:t>24</a:t>
-            </a:fld>
             <a:endParaRPr lang="en-US" dirty="0"/>
           </a:p>
         </p:txBody>
       </p:sp>
       <p:sp>
         <p:nvSpPr>
-          <p:cNvPr id="10" name="Date Placeholder 9"/>
+          <p:cNvPr id="5" name="Footer Placeholder 4"/>
           <p:cNvSpPr>
             <a:spLocks noGrp="1"/>
           </p:cNvSpPr>
           <p:nvPr>
-            <p:ph type="dt" idx="13"/>
-          </p:nvPr>
-        </p:nvSpPr>
-        <p:spPr/>
-        <p:txBody>
-          <a:bodyPr/>
-          <a:lstStyle/>
-          <a:p>
-            <a:fld id="{6108602D-D426-4C00-B215-BFA18C076426}" type="datetime8">
-              <a:rPr lang="en-US" smtClean="0"/>
-              <a:t>9/28/15 1:26 PM</a:t>
-            </a:fld>
-            <a:endParaRPr lang="en-US" dirty="0"/>
-          </a:p>
-        </p:txBody>
-      </p:sp>
-      <p:sp>
-        <p:nvSpPr>
-          <p:cNvPr id="4" name="Footer Placeholder 3"/>
-          <p:cNvSpPr>
-            <a:spLocks noGrp="1"/>
-          </p:cNvSpPr>
-          <p:nvPr>
-            <p:ph type="ftr" sz="quarter" idx="14"/>
+            <p:ph type="ftr" sz="quarter" idx="11"/>
           </p:nvPr>
         </p:nvSpPr>
         <p:spPr/>
@@ -1886,6 +1864,758 @@
       </p:sp>
       <p:sp>
         <p:nvSpPr>
+          <p:cNvPr id="6" name="Date Placeholder 5"/>
+          <p:cNvSpPr>
+            <a:spLocks noGrp="1"/>
+          </p:cNvSpPr>
+          <p:nvPr>
+            <p:ph type="dt" idx="12"/>
+          </p:nvPr>
+        </p:nvSpPr>
+        <p:spPr/>
+        <p:txBody>
+          <a:bodyPr/>
+          <a:lstStyle/>
+          <a:p>
+            <a:fld id="{7D10C09F-FCA1-48C8-B40D-42E1045D109E}" type="datetime8">
+              <a:rPr lang="en-US" smtClean="0"/>
+              <a:t>9/28/15 1:45 PM</a:t>
+            </a:fld>
+            <a:endParaRPr lang="en-US" dirty="0"/>
+          </a:p>
+        </p:txBody>
+      </p:sp>
+      <p:sp>
+        <p:nvSpPr>
+          <p:cNvPr id="7" name="Slide Number Placeholder 6"/>
+          <p:cNvSpPr>
+            <a:spLocks noGrp="1"/>
+          </p:cNvSpPr>
+          <p:nvPr>
+            <p:ph type="sldNum" sz="quarter" idx="13"/>
+          </p:nvPr>
+        </p:nvSpPr>
+        <p:spPr/>
+        <p:txBody>
+          <a:bodyPr/>
+          <a:lstStyle/>
+          <a:p>
+            <a:fld id="{B4008EB6-D09E-4580-8CD6-DDB14511944F}" type="slidenum">
+              <a:rPr lang="en-US" smtClean="0"/>
+              <a:pPr/>
+              <a:t>23</a:t>
+            </a:fld>
+            <a:endParaRPr lang="en-US" dirty="0"/>
+          </a:p>
+        </p:txBody>
+      </p:sp>
+    </p:spTree>
+    <p:extLst>
+      <p:ext uri="{BB962C8B-B14F-4D97-AF65-F5344CB8AC3E}">
+        <p14:creationId xmlns:p14="http://schemas.microsoft.com/office/powerpoint/2010/main" val="1842705465"/>
+      </p:ext>
+    </p:extLst>
+  </p:cSld>
+  <p:clrMapOvr>
+    <a:masterClrMapping/>
+  </p:clrMapOvr>
+</p:notes>
+</file>
+
+<file path=ppt/notesSlides/notesSlide15.xml><?xml version="1.0" encoding="utf-8"?>
+<p:notes xmlns:a="http://schemas.openxmlformats.org/drawingml/2006/main" xmlns:r="http://schemas.openxmlformats.org/officeDocument/2006/relationships" xmlns:p="http://schemas.openxmlformats.org/presentationml/2006/main">
+  <p:cSld>
+    <p:spTree>
+      <p:nvGrpSpPr>
+        <p:cNvPr id="1" name=""/>
+        <p:cNvGrpSpPr/>
+        <p:nvPr/>
+      </p:nvGrpSpPr>
+      <p:grpSpPr>
+        <a:xfrm>
+          <a:off x="0" y="0"/>
+          <a:ext cx="0" cy="0"/>
+          <a:chOff x="0" y="0"/>
+          <a:chExt cx="0" cy="0"/>
+        </a:xfrm>
+      </p:grpSpPr>
+      <p:sp>
+        <p:nvSpPr>
+          <p:cNvPr id="2" name="Slide Image Placeholder 1"/>
+          <p:cNvSpPr>
+            <a:spLocks noGrp="1" noRot="1" noChangeAspect="1"/>
+          </p:cNvSpPr>
+          <p:nvPr>
+            <p:ph type="sldImg"/>
+          </p:nvPr>
+        </p:nvSpPr>
+        <p:spPr/>
+      </p:sp>
+      <p:sp>
+        <p:nvSpPr>
+          <p:cNvPr id="3" name="Notes Placeholder 2"/>
+          <p:cNvSpPr>
+            <a:spLocks noGrp="1"/>
+          </p:cNvSpPr>
+          <p:nvPr>
+            <p:ph type="body" idx="1"/>
+          </p:nvPr>
+        </p:nvSpPr>
+        <p:spPr/>
+        <p:txBody>
+          <a:bodyPr/>
+          <a:lstStyle/>
+          <a:p>
+            <a:endParaRPr lang="en-US"/>
+          </a:p>
+        </p:txBody>
+      </p:sp>
+      <p:sp>
+        <p:nvSpPr>
+          <p:cNvPr id="4" name="Header Placeholder 3"/>
+          <p:cNvSpPr>
+            <a:spLocks noGrp="1"/>
+          </p:cNvSpPr>
+          <p:nvPr>
+            <p:ph type="hdr" sz="quarter" idx="10"/>
+          </p:nvPr>
+        </p:nvSpPr>
+        <p:spPr/>
+        <p:txBody>
+          <a:bodyPr/>
+          <a:lstStyle/>
+          <a:p>
+            <a:endParaRPr lang="en-US" dirty="0"/>
+          </a:p>
+        </p:txBody>
+      </p:sp>
+      <p:sp>
+        <p:nvSpPr>
+          <p:cNvPr id="5" name="Footer Placeholder 4"/>
+          <p:cNvSpPr>
+            <a:spLocks noGrp="1"/>
+          </p:cNvSpPr>
+          <p:nvPr>
+            <p:ph type="ftr" sz="quarter" idx="11"/>
+          </p:nvPr>
+        </p:nvSpPr>
+        <p:spPr/>
+        <p:txBody>
+          <a:bodyPr/>
+          <a:lstStyle/>
+          <a:p>
+            <a:pPr defTabSz="914099" eaLnBrk="0" hangingPunct="0"/>
+            <a:r>
+              <a:rPr lang="en-US" sz="400" smtClean="0">
+                <a:gradFill>
+                  <a:gsLst>
+                    <a:gs pos="0">
+                      <a:prstClr val="black"/>
+                    </a:gs>
+                    <a:gs pos="100000">
+                      <a:prstClr val="black"/>
+                    </a:gs>
+                  </a:gsLst>
+                  <a:lin ang="5400000" scaled="0"/>
+                </a:gradFill>
+                <a:latin typeface="Segoe UI" pitchFamily="34" charset="0"/>
+                <a:ea typeface="Segoe UI" pitchFamily="34" charset="0"/>
+                <a:cs typeface="Segoe UI" pitchFamily="34" charset="0"/>
+              </a:rPr>
+              <a:t>© 2014 Microsoft Corporation. All rights reserved. MICROSOFT MAKES NO WARRANTIES, EXPRESS, IMPLIED OR STATUTORY, AS TO THE INFORMATION IN THIS PRESENTATION.</a:t>
+            </a:r>
+            <a:endParaRPr lang="en-US" sz="400" dirty="0" smtClean="0">
+              <a:gradFill>
+                <a:gsLst>
+                  <a:gs pos="0">
+                    <a:prstClr val="black"/>
+                  </a:gs>
+                  <a:gs pos="100000">
+                    <a:prstClr val="black"/>
+                  </a:gs>
+                </a:gsLst>
+                <a:lin ang="5400000" scaled="0"/>
+              </a:gradFill>
+              <a:latin typeface="Segoe UI" pitchFamily="34" charset="0"/>
+              <a:ea typeface="Segoe UI" pitchFamily="34" charset="0"/>
+              <a:cs typeface="Segoe UI" pitchFamily="34" charset="0"/>
+            </a:endParaRPr>
+          </a:p>
+        </p:txBody>
+      </p:sp>
+      <p:sp>
+        <p:nvSpPr>
+          <p:cNvPr id="6" name="Date Placeholder 5"/>
+          <p:cNvSpPr>
+            <a:spLocks noGrp="1"/>
+          </p:cNvSpPr>
+          <p:nvPr>
+            <p:ph type="dt" idx="12"/>
+          </p:nvPr>
+        </p:nvSpPr>
+        <p:spPr/>
+        <p:txBody>
+          <a:bodyPr/>
+          <a:lstStyle/>
+          <a:p>
+            <a:fld id="{7D10C09F-FCA1-48C8-B40D-42E1045D109E}" type="datetime8">
+              <a:rPr lang="en-US" smtClean="0"/>
+              <a:t>9/28/15 1:45 PM</a:t>
+            </a:fld>
+            <a:endParaRPr lang="en-US" dirty="0"/>
+          </a:p>
+        </p:txBody>
+      </p:sp>
+      <p:sp>
+        <p:nvSpPr>
+          <p:cNvPr id="7" name="Slide Number Placeholder 6"/>
+          <p:cNvSpPr>
+            <a:spLocks noGrp="1"/>
+          </p:cNvSpPr>
+          <p:nvPr>
+            <p:ph type="sldNum" sz="quarter" idx="13"/>
+          </p:nvPr>
+        </p:nvSpPr>
+        <p:spPr/>
+        <p:txBody>
+          <a:bodyPr/>
+          <a:lstStyle/>
+          <a:p>
+            <a:fld id="{B4008EB6-D09E-4580-8CD6-DDB14511944F}" type="slidenum">
+              <a:rPr lang="en-US" smtClean="0"/>
+              <a:pPr/>
+              <a:t>24</a:t>
+            </a:fld>
+            <a:endParaRPr lang="en-US" dirty="0"/>
+          </a:p>
+        </p:txBody>
+      </p:sp>
+    </p:spTree>
+    <p:extLst>
+      <p:ext uri="{BB962C8B-B14F-4D97-AF65-F5344CB8AC3E}">
+        <p14:creationId xmlns:p14="http://schemas.microsoft.com/office/powerpoint/2010/main" val="1271038713"/>
+      </p:ext>
+    </p:extLst>
+  </p:cSld>
+  <p:clrMapOvr>
+    <a:masterClrMapping/>
+  </p:clrMapOvr>
+</p:notes>
+</file>
+
+<file path=ppt/notesSlides/notesSlide16.xml><?xml version="1.0" encoding="utf-8"?>
+<p:notes xmlns:a="http://schemas.openxmlformats.org/drawingml/2006/main" xmlns:r="http://schemas.openxmlformats.org/officeDocument/2006/relationships" xmlns:p="http://schemas.openxmlformats.org/presentationml/2006/main">
+  <p:cSld>
+    <p:spTree>
+      <p:nvGrpSpPr>
+        <p:cNvPr id="1" name=""/>
+        <p:cNvGrpSpPr/>
+        <p:nvPr/>
+      </p:nvGrpSpPr>
+      <p:grpSpPr>
+        <a:xfrm>
+          <a:off x="0" y="0"/>
+          <a:ext cx="0" cy="0"/>
+          <a:chOff x="0" y="0"/>
+          <a:chExt cx="0" cy="0"/>
+        </a:xfrm>
+      </p:grpSpPr>
+      <p:sp>
+        <p:nvSpPr>
+          <p:cNvPr id="2" name="Slide Image Placeholder 1"/>
+          <p:cNvSpPr>
+            <a:spLocks noGrp="1" noRot="1" noChangeAspect="1"/>
+          </p:cNvSpPr>
+          <p:nvPr>
+            <p:ph type="sldImg"/>
+          </p:nvPr>
+        </p:nvSpPr>
+        <p:spPr/>
+      </p:sp>
+      <p:sp>
+        <p:nvSpPr>
+          <p:cNvPr id="3" name="Notes Placeholder 2"/>
+          <p:cNvSpPr>
+            <a:spLocks noGrp="1"/>
+          </p:cNvSpPr>
+          <p:nvPr>
+            <p:ph type="body" idx="1"/>
+          </p:nvPr>
+        </p:nvSpPr>
+        <p:spPr/>
+        <p:txBody>
+          <a:bodyPr/>
+          <a:lstStyle/>
+          <a:p>
+            <a:endParaRPr lang="en-US"/>
+          </a:p>
+        </p:txBody>
+      </p:sp>
+      <p:sp>
+        <p:nvSpPr>
+          <p:cNvPr id="4" name="Header Placeholder 3"/>
+          <p:cNvSpPr>
+            <a:spLocks noGrp="1"/>
+          </p:cNvSpPr>
+          <p:nvPr>
+            <p:ph type="hdr" sz="quarter" idx="10"/>
+          </p:nvPr>
+        </p:nvSpPr>
+        <p:spPr/>
+        <p:txBody>
+          <a:bodyPr/>
+          <a:lstStyle/>
+          <a:p>
+            <a:endParaRPr lang="en-US" dirty="0"/>
+          </a:p>
+        </p:txBody>
+      </p:sp>
+      <p:sp>
+        <p:nvSpPr>
+          <p:cNvPr id="5" name="Footer Placeholder 4"/>
+          <p:cNvSpPr>
+            <a:spLocks noGrp="1"/>
+          </p:cNvSpPr>
+          <p:nvPr>
+            <p:ph type="ftr" sz="quarter" idx="11"/>
+          </p:nvPr>
+        </p:nvSpPr>
+        <p:spPr/>
+        <p:txBody>
+          <a:bodyPr/>
+          <a:lstStyle/>
+          <a:p>
+            <a:pPr defTabSz="914099" eaLnBrk="0" hangingPunct="0"/>
+            <a:r>
+              <a:rPr lang="en-US" sz="400" smtClean="0">
+                <a:gradFill>
+                  <a:gsLst>
+                    <a:gs pos="0">
+                      <a:prstClr val="black"/>
+                    </a:gs>
+                    <a:gs pos="100000">
+                      <a:prstClr val="black"/>
+                    </a:gs>
+                  </a:gsLst>
+                  <a:lin ang="5400000" scaled="0"/>
+                </a:gradFill>
+                <a:latin typeface="Segoe UI" pitchFamily="34" charset="0"/>
+                <a:ea typeface="Segoe UI" pitchFamily="34" charset="0"/>
+                <a:cs typeface="Segoe UI" pitchFamily="34" charset="0"/>
+              </a:rPr>
+              <a:t>© 2014 Microsoft Corporation. All rights reserved. MICROSOFT MAKES NO WARRANTIES, EXPRESS, IMPLIED OR STATUTORY, AS TO THE INFORMATION IN THIS PRESENTATION.</a:t>
+            </a:r>
+            <a:endParaRPr lang="en-US" sz="400" dirty="0" smtClean="0">
+              <a:gradFill>
+                <a:gsLst>
+                  <a:gs pos="0">
+                    <a:prstClr val="black"/>
+                  </a:gs>
+                  <a:gs pos="100000">
+                    <a:prstClr val="black"/>
+                  </a:gs>
+                </a:gsLst>
+                <a:lin ang="5400000" scaled="0"/>
+              </a:gradFill>
+              <a:latin typeface="Segoe UI" pitchFamily="34" charset="0"/>
+              <a:ea typeface="Segoe UI" pitchFamily="34" charset="0"/>
+              <a:cs typeface="Segoe UI" pitchFamily="34" charset="0"/>
+            </a:endParaRPr>
+          </a:p>
+        </p:txBody>
+      </p:sp>
+      <p:sp>
+        <p:nvSpPr>
+          <p:cNvPr id="6" name="Date Placeholder 5"/>
+          <p:cNvSpPr>
+            <a:spLocks noGrp="1"/>
+          </p:cNvSpPr>
+          <p:nvPr>
+            <p:ph type="dt" idx="12"/>
+          </p:nvPr>
+        </p:nvSpPr>
+        <p:spPr/>
+        <p:txBody>
+          <a:bodyPr/>
+          <a:lstStyle/>
+          <a:p>
+            <a:fld id="{90EC29EE-A8AD-4CE0-9C0B-116E0D4D7533}" type="datetime8">
+              <a:rPr lang="en-US" smtClean="0"/>
+              <a:t>9/28/15 5:20 PM</a:t>
+            </a:fld>
+            <a:endParaRPr lang="en-US" dirty="0"/>
+          </a:p>
+        </p:txBody>
+      </p:sp>
+      <p:sp>
+        <p:nvSpPr>
+          <p:cNvPr id="7" name="Slide Number Placeholder 6"/>
+          <p:cNvSpPr>
+            <a:spLocks noGrp="1"/>
+          </p:cNvSpPr>
+          <p:nvPr>
+            <p:ph type="sldNum" sz="quarter" idx="13"/>
+          </p:nvPr>
+        </p:nvSpPr>
+        <p:spPr/>
+        <p:txBody>
+          <a:bodyPr/>
+          <a:lstStyle/>
+          <a:p>
+            <a:fld id="{B4008EB6-D09E-4580-8CD6-DDB14511944F}" type="slidenum">
+              <a:rPr lang="en-US" smtClean="0"/>
+              <a:pPr/>
+              <a:t>25</a:t>
+            </a:fld>
+            <a:endParaRPr lang="en-US" dirty="0"/>
+          </a:p>
+        </p:txBody>
+      </p:sp>
+    </p:spTree>
+    <p:extLst>
+      <p:ext uri="{BB962C8B-B14F-4D97-AF65-F5344CB8AC3E}">
+        <p14:creationId xmlns:p14="http://schemas.microsoft.com/office/powerpoint/2010/main" val="405178554"/>
+      </p:ext>
+    </p:extLst>
+  </p:cSld>
+  <p:clrMapOvr>
+    <a:masterClrMapping/>
+  </p:clrMapOvr>
+</p:notes>
+</file>
+
+<file path=ppt/notesSlides/notesSlide17.xml><?xml version="1.0" encoding="utf-8"?>
+<p:notes xmlns:a="http://schemas.openxmlformats.org/drawingml/2006/main" xmlns:r="http://schemas.openxmlformats.org/officeDocument/2006/relationships" xmlns:p="http://schemas.openxmlformats.org/presentationml/2006/main">
+  <p:cSld>
+    <p:spTree>
+      <p:nvGrpSpPr>
+        <p:cNvPr id="1" name=""/>
+        <p:cNvGrpSpPr/>
+        <p:nvPr/>
+      </p:nvGrpSpPr>
+      <p:grpSpPr>
+        <a:xfrm>
+          <a:off x="0" y="0"/>
+          <a:ext cx="0" cy="0"/>
+          <a:chOff x="0" y="0"/>
+          <a:chExt cx="0" cy="0"/>
+        </a:xfrm>
+      </p:grpSpPr>
+      <p:sp>
+        <p:nvSpPr>
+          <p:cNvPr id="2" name="Slide Image Placeholder 1"/>
+          <p:cNvSpPr>
+            <a:spLocks noGrp="1" noRot="1" noChangeAspect="1"/>
+          </p:cNvSpPr>
+          <p:nvPr>
+            <p:ph type="sldImg"/>
+          </p:nvPr>
+        </p:nvSpPr>
+        <p:spPr/>
+      </p:sp>
+      <p:sp>
+        <p:nvSpPr>
+          <p:cNvPr id="3" name="Notes Placeholder 2"/>
+          <p:cNvSpPr>
+            <a:spLocks noGrp="1"/>
+          </p:cNvSpPr>
+          <p:nvPr>
+            <p:ph type="body" idx="1"/>
+          </p:nvPr>
+        </p:nvSpPr>
+        <p:spPr/>
+        <p:txBody>
+          <a:bodyPr/>
+          <a:lstStyle/>
+          <a:p>
+            <a:endParaRPr lang="en-US"/>
+          </a:p>
+        </p:txBody>
+      </p:sp>
+      <p:sp>
+        <p:nvSpPr>
+          <p:cNvPr id="4" name="Header Placeholder 3"/>
+          <p:cNvSpPr>
+            <a:spLocks noGrp="1"/>
+          </p:cNvSpPr>
+          <p:nvPr>
+            <p:ph type="hdr" sz="quarter" idx="10"/>
+          </p:nvPr>
+        </p:nvSpPr>
+        <p:spPr/>
+        <p:txBody>
+          <a:bodyPr/>
+          <a:lstStyle/>
+          <a:p>
+            <a:endParaRPr lang="en-US" dirty="0"/>
+          </a:p>
+        </p:txBody>
+      </p:sp>
+      <p:sp>
+        <p:nvSpPr>
+          <p:cNvPr id="5" name="Footer Placeholder 4"/>
+          <p:cNvSpPr>
+            <a:spLocks noGrp="1"/>
+          </p:cNvSpPr>
+          <p:nvPr>
+            <p:ph type="ftr" sz="quarter" idx="11"/>
+          </p:nvPr>
+        </p:nvSpPr>
+        <p:spPr/>
+        <p:txBody>
+          <a:bodyPr/>
+          <a:lstStyle/>
+          <a:p>
+            <a:pPr defTabSz="914099" eaLnBrk="0" hangingPunct="0"/>
+            <a:r>
+              <a:rPr lang="en-US" sz="400" smtClean="0">
+                <a:gradFill>
+                  <a:gsLst>
+                    <a:gs pos="0">
+                      <a:prstClr val="black"/>
+                    </a:gs>
+                    <a:gs pos="100000">
+                      <a:prstClr val="black"/>
+                    </a:gs>
+                  </a:gsLst>
+                  <a:lin ang="5400000" scaled="0"/>
+                </a:gradFill>
+                <a:latin typeface="Segoe UI" pitchFamily="34" charset="0"/>
+                <a:ea typeface="Segoe UI" pitchFamily="34" charset="0"/>
+                <a:cs typeface="Segoe UI" pitchFamily="34" charset="0"/>
+              </a:rPr>
+              <a:t>© 2014 Microsoft Corporation. All rights reserved. MICROSOFT MAKES NO WARRANTIES, EXPRESS, IMPLIED OR STATUTORY, AS TO THE INFORMATION IN THIS PRESENTATION.</a:t>
+            </a:r>
+            <a:endParaRPr lang="en-US" sz="400" dirty="0" smtClean="0">
+              <a:gradFill>
+                <a:gsLst>
+                  <a:gs pos="0">
+                    <a:prstClr val="black"/>
+                  </a:gs>
+                  <a:gs pos="100000">
+                    <a:prstClr val="black"/>
+                  </a:gs>
+                </a:gsLst>
+                <a:lin ang="5400000" scaled="0"/>
+              </a:gradFill>
+              <a:latin typeface="Segoe UI" pitchFamily="34" charset="0"/>
+              <a:ea typeface="Segoe UI" pitchFamily="34" charset="0"/>
+              <a:cs typeface="Segoe UI" pitchFamily="34" charset="0"/>
+            </a:endParaRPr>
+          </a:p>
+        </p:txBody>
+      </p:sp>
+      <p:sp>
+        <p:nvSpPr>
+          <p:cNvPr id="6" name="Date Placeholder 5"/>
+          <p:cNvSpPr>
+            <a:spLocks noGrp="1"/>
+          </p:cNvSpPr>
+          <p:nvPr>
+            <p:ph type="dt" idx="12"/>
+          </p:nvPr>
+        </p:nvSpPr>
+        <p:spPr/>
+        <p:txBody>
+          <a:bodyPr/>
+          <a:lstStyle/>
+          <a:p>
+            <a:fld id="{23A5C127-CB05-47B6-8D1E-7BC74A68F508}" type="datetime8">
+              <a:rPr lang="en-US" smtClean="0"/>
+              <a:t>9/28/15 1:26 PM</a:t>
+            </a:fld>
+            <a:endParaRPr lang="en-US" dirty="0"/>
+          </a:p>
+        </p:txBody>
+      </p:sp>
+      <p:sp>
+        <p:nvSpPr>
+          <p:cNvPr id="7" name="Slide Number Placeholder 6"/>
+          <p:cNvSpPr>
+            <a:spLocks noGrp="1"/>
+          </p:cNvSpPr>
+          <p:nvPr>
+            <p:ph type="sldNum" sz="quarter" idx="13"/>
+          </p:nvPr>
+        </p:nvSpPr>
+        <p:spPr/>
+        <p:txBody>
+          <a:bodyPr/>
+          <a:lstStyle/>
+          <a:p>
+            <a:fld id="{B4008EB6-D09E-4580-8CD6-DDB14511944F}" type="slidenum">
+              <a:rPr lang="en-US" smtClean="0"/>
+              <a:pPr/>
+              <a:t>26</a:t>
+            </a:fld>
+            <a:endParaRPr lang="en-US" dirty="0"/>
+          </a:p>
+        </p:txBody>
+      </p:sp>
+    </p:spTree>
+    <p:extLst>
+      <p:ext uri="{BB962C8B-B14F-4D97-AF65-F5344CB8AC3E}">
+        <p14:creationId xmlns:p14="http://schemas.microsoft.com/office/powerpoint/2010/main" val="305656114"/>
+      </p:ext>
+    </p:extLst>
+  </p:cSld>
+  <p:clrMapOvr>
+    <a:masterClrMapping/>
+  </p:clrMapOvr>
+</p:notes>
+</file>
+
+<file path=ppt/notesSlides/notesSlide18.xml><?xml version="1.0" encoding="utf-8"?>
+<p:notes xmlns:a="http://schemas.openxmlformats.org/drawingml/2006/main" xmlns:r="http://schemas.openxmlformats.org/officeDocument/2006/relationships" xmlns:p="http://schemas.openxmlformats.org/presentationml/2006/main">
+  <p:cSld>
+    <p:spTree>
+      <p:nvGrpSpPr>
+        <p:cNvPr id="1" name=""/>
+        <p:cNvGrpSpPr/>
+        <p:nvPr/>
+      </p:nvGrpSpPr>
+      <p:grpSpPr>
+        <a:xfrm>
+          <a:off x="0" y="0"/>
+          <a:ext cx="0" cy="0"/>
+          <a:chOff x="0" y="0"/>
+          <a:chExt cx="0" cy="0"/>
+        </a:xfrm>
+      </p:grpSpPr>
+      <p:sp>
+        <p:nvSpPr>
+          <p:cNvPr id="2" name="Slide Image Placeholder 1"/>
+          <p:cNvSpPr>
+            <a:spLocks noGrp="1" noRot="1" noChangeAspect="1"/>
+          </p:cNvSpPr>
+          <p:nvPr>
+            <p:ph type="sldImg"/>
+          </p:nvPr>
+        </p:nvSpPr>
+        <p:spPr/>
+      </p:sp>
+      <p:sp>
+        <p:nvSpPr>
+          <p:cNvPr id="3" name="Notes Placeholder 2"/>
+          <p:cNvSpPr>
+            <a:spLocks noGrp="1"/>
+          </p:cNvSpPr>
+          <p:nvPr>
+            <p:ph type="body" idx="1"/>
+          </p:nvPr>
+        </p:nvSpPr>
+        <p:spPr/>
+        <p:txBody>
+          <a:bodyPr/>
+          <a:lstStyle/>
+          <a:p>
+            <a:endParaRPr lang="en-US"/>
+          </a:p>
+        </p:txBody>
+      </p:sp>
+      <p:sp>
+        <p:nvSpPr>
+          <p:cNvPr id="6" name="Slide Number Placeholder 5"/>
+          <p:cNvSpPr>
+            <a:spLocks noGrp="1"/>
+          </p:cNvSpPr>
+          <p:nvPr>
+            <p:ph type="sldNum" sz="quarter" idx="12"/>
+          </p:nvPr>
+        </p:nvSpPr>
+        <p:spPr/>
+        <p:txBody>
+          <a:bodyPr/>
+          <a:lstStyle/>
+          <a:p>
+            <a:fld id="{B4008EB6-D09E-4580-8CD6-DDB14511944F}" type="slidenum">
+              <a:rPr lang="en-US" smtClean="0"/>
+              <a:pPr/>
+              <a:t>27</a:t>
+            </a:fld>
+            <a:endParaRPr lang="en-US" dirty="0"/>
+          </a:p>
+        </p:txBody>
+      </p:sp>
+      <p:sp>
+        <p:nvSpPr>
+          <p:cNvPr id="10" name="Date Placeholder 9"/>
+          <p:cNvSpPr>
+            <a:spLocks noGrp="1"/>
+          </p:cNvSpPr>
+          <p:nvPr>
+            <p:ph type="dt" idx="13"/>
+          </p:nvPr>
+        </p:nvSpPr>
+        <p:spPr/>
+        <p:txBody>
+          <a:bodyPr/>
+          <a:lstStyle/>
+          <a:p>
+            <a:fld id="{6108602D-D426-4C00-B215-BFA18C076426}" type="datetime8">
+              <a:rPr lang="en-US" smtClean="0"/>
+              <a:t>9/28/15 1:26 PM</a:t>
+            </a:fld>
+            <a:endParaRPr lang="en-US" dirty="0"/>
+          </a:p>
+        </p:txBody>
+      </p:sp>
+      <p:sp>
+        <p:nvSpPr>
+          <p:cNvPr id="4" name="Footer Placeholder 3"/>
+          <p:cNvSpPr>
+            <a:spLocks noGrp="1"/>
+          </p:cNvSpPr>
+          <p:nvPr>
+            <p:ph type="ftr" sz="quarter" idx="14"/>
+          </p:nvPr>
+        </p:nvSpPr>
+        <p:spPr/>
+        <p:txBody>
+          <a:bodyPr/>
+          <a:lstStyle/>
+          <a:p>
+            <a:pPr defTabSz="914099" eaLnBrk="0" hangingPunct="0"/>
+            <a:r>
+              <a:rPr lang="en-US" sz="400" smtClean="0">
+                <a:gradFill>
+                  <a:gsLst>
+                    <a:gs pos="0">
+                      <a:prstClr val="black"/>
+                    </a:gs>
+                    <a:gs pos="100000">
+                      <a:prstClr val="black"/>
+                    </a:gs>
+                  </a:gsLst>
+                  <a:lin ang="5400000" scaled="0"/>
+                </a:gradFill>
+                <a:latin typeface="Segoe UI" pitchFamily="34" charset="0"/>
+                <a:ea typeface="Segoe UI" pitchFamily="34" charset="0"/>
+                <a:cs typeface="Segoe UI" pitchFamily="34" charset="0"/>
+              </a:rPr>
+              <a:t>© 2014 Microsoft Corporation. All rights reserved. MICROSOFT MAKES NO WARRANTIES, EXPRESS, IMPLIED OR STATUTORY, AS TO THE INFORMATION IN THIS PRESENTATION.</a:t>
+            </a:r>
+            <a:endParaRPr lang="en-US" sz="400" dirty="0" smtClean="0">
+              <a:gradFill>
+                <a:gsLst>
+                  <a:gs pos="0">
+                    <a:prstClr val="black"/>
+                  </a:gs>
+                  <a:gs pos="100000">
+                    <a:prstClr val="black"/>
+                  </a:gs>
+                </a:gsLst>
+                <a:lin ang="5400000" scaled="0"/>
+              </a:gradFill>
+              <a:latin typeface="Segoe UI" pitchFamily="34" charset="0"/>
+              <a:ea typeface="Segoe UI" pitchFamily="34" charset="0"/>
+              <a:cs typeface="Segoe UI" pitchFamily="34" charset="0"/>
+            </a:endParaRPr>
+          </a:p>
+        </p:txBody>
+      </p:sp>
+      <p:sp>
+        <p:nvSpPr>
           <p:cNvPr id="5" name="Header Placeholder 4"/>
           <p:cNvSpPr>
             <a:spLocks noGrp="1"/>
@@ -1916,7 +2646,7 @@
 </p:notes>
 </file>
 
-<file path=ppt/notesSlides/notesSlide15.xml><?xml version="1.0" encoding="utf-8"?>
+<file path=ppt/notesSlides/notesSlide19.xml><?xml version="1.0" encoding="utf-8"?>
 <p:notes xmlns:a="http://schemas.openxmlformats.org/drawingml/2006/main" xmlns:r="http://schemas.openxmlformats.org/officeDocument/2006/relationships" xmlns:p="http://schemas.openxmlformats.org/presentationml/2006/main">
   <p:cSld>
     <p:spTree>
@@ -2055,7 +2785,7 @@
                 </a:solidFill>
               </a:rPr>
               <a:pPr/>
-              <a:t>25</a:t>
+              <a:t>28</a:t>
             </a:fld>
             <a:endParaRPr lang="en-US" dirty="0">
               <a:solidFill>
@@ -2123,222 +2853,6 @@
     <p:extLst>
       <p:ext uri="{BB962C8B-B14F-4D97-AF65-F5344CB8AC3E}">
         <p14:creationId xmlns:p14="http://schemas.microsoft.com/office/powerpoint/2010/main" val="2603928605"/>
-      </p:ext>
-    </p:extLst>
-  </p:cSld>
-  <p:clrMapOvr>
-    <a:masterClrMapping/>
-  </p:clrMapOvr>
-</p:notes>
-</file>
-
-<file path=ppt/notesSlides/notesSlide16.xml><?xml version="1.0" encoding="utf-8"?>
-<p:notes xmlns:a="http://schemas.openxmlformats.org/drawingml/2006/main" xmlns:r="http://schemas.openxmlformats.org/officeDocument/2006/relationships" xmlns:p="http://schemas.openxmlformats.org/presentationml/2006/main">
-  <p:cSld>
-    <p:spTree>
-      <p:nvGrpSpPr>
-        <p:cNvPr id="1" name=""/>
-        <p:cNvGrpSpPr/>
-        <p:nvPr/>
-      </p:nvGrpSpPr>
-      <p:grpSpPr>
-        <a:xfrm>
-          <a:off x="0" y="0"/>
-          <a:ext cx="0" cy="0"/>
-          <a:chOff x="0" y="0"/>
-          <a:chExt cx="0" cy="0"/>
-        </a:xfrm>
-      </p:grpSpPr>
-      <p:sp>
-        <p:nvSpPr>
-          <p:cNvPr id="2" name="Slide Image Placeholder 1"/>
-          <p:cNvSpPr>
-            <a:spLocks noGrp="1" noRot="1" noChangeAspect="1"/>
-          </p:cNvSpPr>
-          <p:nvPr>
-            <p:ph type="sldImg"/>
-          </p:nvPr>
-        </p:nvSpPr>
-        <p:spPr>
-          <a:xfrm>
-            <a:off x="381000" y="685800"/>
-            <a:ext cx="6096000" cy="3429000"/>
-          </a:xfrm>
-        </p:spPr>
-      </p:sp>
-      <p:sp>
-        <p:nvSpPr>
-          <p:cNvPr id="3" name="Notes Placeholder 2"/>
-          <p:cNvSpPr>
-            <a:spLocks noGrp="1"/>
-          </p:cNvSpPr>
-          <p:nvPr>
-            <p:ph type="body" idx="1"/>
-          </p:nvPr>
-        </p:nvSpPr>
-        <p:spPr/>
-        <p:txBody>
-          <a:bodyPr>
-            <a:normAutofit/>
-          </a:bodyPr>
-          <a:lstStyle/>
-          <a:p>
-            <a:endParaRPr lang="en-US" dirty="0"/>
-          </a:p>
-        </p:txBody>
-      </p:sp>
-      <p:sp>
-        <p:nvSpPr>
-          <p:cNvPr id="4" name="Header Placeholder 3"/>
-          <p:cNvSpPr>
-            <a:spLocks noGrp="1"/>
-          </p:cNvSpPr>
-          <p:nvPr>
-            <p:ph type="hdr" sz="quarter" idx="10"/>
-          </p:nvPr>
-        </p:nvSpPr>
-        <p:spPr>
-          <a:xfrm>
-            <a:off x="0" y="0"/>
-            <a:ext cx="2971800" cy="457200"/>
-          </a:xfrm>
-          <a:prstGeom prst="rect">
-            <a:avLst/>
-          </a:prstGeom>
-        </p:spPr>
-        <p:txBody>
-          <a:bodyPr/>
-          <a:lstStyle/>
-          <a:p>
-            <a:endParaRPr lang="en-US" dirty="0">
-              <a:solidFill>
-                <a:prstClr val="black"/>
-              </a:solidFill>
-            </a:endParaRPr>
-          </a:p>
-        </p:txBody>
-      </p:sp>
-      <p:sp>
-        <p:nvSpPr>
-          <p:cNvPr id="5" name="Date Placeholder 4"/>
-          <p:cNvSpPr>
-            <a:spLocks noGrp="1"/>
-          </p:cNvSpPr>
-          <p:nvPr>
-            <p:ph type="dt" idx="11"/>
-          </p:nvPr>
-        </p:nvSpPr>
-        <p:spPr/>
-        <p:txBody>
-          <a:bodyPr/>
-          <a:lstStyle/>
-          <a:p>
-            <a:fld id="{8A17D118-1690-458F-B4D2-F9DA5D6F5033}" type="datetime8">
-              <a:rPr lang="en-US" smtClean="0">
-                <a:solidFill>
-                  <a:prstClr val="black"/>
-                </a:solidFill>
-              </a:rPr>
-              <a:t>9/28/15 1:26 PM</a:t>
-            </a:fld>
-            <a:endParaRPr lang="en-US" dirty="0">
-              <a:solidFill>
-                <a:prstClr val="black"/>
-              </a:solidFill>
-            </a:endParaRPr>
-          </a:p>
-        </p:txBody>
-      </p:sp>
-      <p:sp>
-        <p:nvSpPr>
-          <p:cNvPr id="7" name="Slide Number Placeholder 6"/>
-          <p:cNvSpPr>
-            <a:spLocks noGrp="1"/>
-          </p:cNvSpPr>
-          <p:nvPr>
-            <p:ph type="sldNum" sz="quarter" idx="13"/>
-          </p:nvPr>
-        </p:nvSpPr>
-        <p:spPr/>
-        <p:txBody>
-          <a:bodyPr/>
-          <a:lstStyle/>
-          <a:p>
-            <a:fld id="{EC87E0CF-87F6-4B58-B8B8-DCAB2DAAF3CA}" type="slidenum">
-              <a:rPr lang="en-US" smtClean="0">
-                <a:solidFill>
-                  <a:prstClr val="black"/>
-                </a:solidFill>
-              </a:rPr>
-              <a:pPr/>
-              <a:t>26</a:t>
-            </a:fld>
-            <a:endParaRPr lang="en-US" dirty="0">
-              <a:solidFill>
-                <a:prstClr val="black"/>
-              </a:solidFill>
-            </a:endParaRPr>
-          </a:p>
-        </p:txBody>
-      </p:sp>
-      <p:sp>
-        <p:nvSpPr>
-          <p:cNvPr id="6" name="Footer Placeholder 5"/>
-          <p:cNvSpPr>
-            <a:spLocks noGrp="1"/>
-          </p:cNvSpPr>
-          <p:nvPr>
-            <p:ph type="ftr" sz="quarter" idx="14"/>
-          </p:nvPr>
-        </p:nvSpPr>
-        <p:spPr/>
-        <p:txBody>
-          <a:bodyPr/>
-          <a:lstStyle/>
-          <a:p>
-            <a:pPr defTabSz="914099" eaLnBrk="0" hangingPunct="0"/>
-            <a:r>
-              <a:rPr lang="en-US" sz="400" smtClean="0">
-                <a:gradFill>
-                  <a:gsLst>
-                    <a:gs pos="0">
-                      <a:prstClr val="black"/>
-                    </a:gs>
-                    <a:gs pos="100000">
-                      <a:prstClr val="black"/>
-                    </a:gs>
-                  </a:gsLst>
-                  <a:lin ang="5400000" scaled="0"/>
-                </a:gradFill>
-                <a:latin typeface="Segoe UI" pitchFamily="34" charset="0"/>
-                <a:ea typeface="Segoe UI" pitchFamily="34" charset="0"/>
-                <a:cs typeface="Segoe UI" pitchFamily="34" charset="0"/>
-              </a:rPr>
-              <a:t>© 2014 Microsoft Corporation. All rights reserved. MICROSOFT MAKES NO WARRANTIES, EXPRESS, IMPLIED OR STATUTORY, AS TO THE INFORMATION IN THIS PRESENTATION.</a:t>
-            </a:r>
-            <a:endParaRPr lang="en-US" sz="400" dirty="0" smtClean="0">
-              <a:gradFill>
-                <a:gsLst>
-                  <a:gs pos="0">
-                    <a:prstClr val="black"/>
-                  </a:gs>
-                  <a:gs pos="100000">
-                    <a:prstClr val="black"/>
-                  </a:gs>
-                </a:gsLst>
-                <a:lin ang="5400000" scaled="0"/>
-              </a:gradFill>
-              <a:latin typeface="Segoe UI" pitchFamily="34" charset="0"/>
-              <a:ea typeface="Segoe UI" pitchFamily="34" charset="0"/>
-              <a:cs typeface="Segoe UI" pitchFamily="34" charset="0"/>
-            </a:endParaRPr>
-          </a:p>
-        </p:txBody>
-      </p:sp>
-    </p:spTree>
-    <p:extLst>
-      <p:ext uri="{BB962C8B-B14F-4D97-AF65-F5344CB8AC3E}">
-        <p14:creationId xmlns:p14="http://schemas.microsoft.com/office/powerpoint/2010/main" val="2861498552"/>
       </p:ext>
     </p:extLst>
   </p:cSld>
@@ -2520,6 +3034,222 @@
     <p:extLst>
       <p:ext uri="{BB962C8B-B14F-4D97-AF65-F5344CB8AC3E}">
         <p14:creationId xmlns:p14="http://schemas.microsoft.com/office/powerpoint/2010/main" val="1289931235"/>
+      </p:ext>
+    </p:extLst>
+  </p:cSld>
+  <p:clrMapOvr>
+    <a:masterClrMapping/>
+  </p:clrMapOvr>
+</p:notes>
+</file>
+
+<file path=ppt/notesSlides/notesSlide20.xml><?xml version="1.0" encoding="utf-8"?>
+<p:notes xmlns:a="http://schemas.openxmlformats.org/drawingml/2006/main" xmlns:r="http://schemas.openxmlformats.org/officeDocument/2006/relationships" xmlns:p="http://schemas.openxmlformats.org/presentationml/2006/main">
+  <p:cSld>
+    <p:spTree>
+      <p:nvGrpSpPr>
+        <p:cNvPr id="1" name=""/>
+        <p:cNvGrpSpPr/>
+        <p:nvPr/>
+      </p:nvGrpSpPr>
+      <p:grpSpPr>
+        <a:xfrm>
+          <a:off x="0" y="0"/>
+          <a:ext cx="0" cy="0"/>
+          <a:chOff x="0" y="0"/>
+          <a:chExt cx="0" cy="0"/>
+        </a:xfrm>
+      </p:grpSpPr>
+      <p:sp>
+        <p:nvSpPr>
+          <p:cNvPr id="2" name="Slide Image Placeholder 1"/>
+          <p:cNvSpPr>
+            <a:spLocks noGrp="1" noRot="1" noChangeAspect="1"/>
+          </p:cNvSpPr>
+          <p:nvPr>
+            <p:ph type="sldImg"/>
+          </p:nvPr>
+        </p:nvSpPr>
+        <p:spPr>
+          <a:xfrm>
+            <a:off x="381000" y="685800"/>
+            <a:ext cx="6096000" cy="3429000"/>
+          </a:xfrm>
+        </p:spPr>
+      </p:sp>
+      <p:sp>
+        <p:nvSpPr>
+          <p:cNvPr id="3" name="Notes Placeholder 2"/>
+          <p:cNvSpPr>
+            <a:spLocks noGrp="1"/>
+          </p:cNvSpPr>
+          <p:nvPr>
+            <p:ph type="body" idx="1"/>
+          </p:nvPr>
+        </p:nvSpPr>
+        <p:spPr/>
+        <p:txBody>
+          <a:bodyPr>
+            <a:normAutofit/>
+          </a:bodyPr>
+          <a:lstStyle/>
+          <a:p>
+            <a:endParaRPr lang="en-US" dirty="0"/>
+          </a:p>
+        </p:txBody>
+      </p:sp>
+      <p:sp>
+        <p:nvSpPr>
+          <p:cNvPr id="4" name="Header Placeholder 3"/>
+          <p:cNvSpPr>
+            <a:spLocks noGrp="1"/>
+          </p:cNvSpPr>
+          <p:nvPr>
+            <p:ph type="hdr" sz="quarter" idx="10"/>
+          </p:nvPr>
+        </p:nvSpPr>
+        <p:spPr>
+          <a:xfrm>
+            <a:off x="0" y="0"/>
+            <a:ext cx="2971800" cy="457200"/>
+          </a:xfrm>
+          <a:prstGeom prst="rect">
+            <a:avLst/>
+          </a:prstGeom>
+        </p:spPr>
+        <p:txBody>
+          <a:bodyPr/>
+          <a:lstStyle/>
+          <a:p>
+            <a:endParaRPr lang="en-US" dirty="0">
+              <a:solidFill>
+                <a:prstClr val="black"/>
+              </a:solidFill>
+            </a:endParaRPr>
+          </a:p>
+        </p:txBody>
+      </p:sp>
+      <p:sp>
+        <p:nvSpPr>
+          <p:cNvPr id="5" name="Date Placeholder 4"/>
+          <p:cNvSpPr>
+            <a:spLocks noGrp="1"/>
+          </p:cNvSpPr>
+          <p:nvPr>
+            <p:ph type="dt" idx="11"/>
+          </p:nvPr>
+        </p:nvSpPr>
+        <p:spPr/>
+        <p:txBody>
+          <a:bodyPr/>
+          <a:lstStyle/>
+          <a:p>
+            <a:fld id="{8A17D118-1690-458F-B4D2-F9DA5D6F5033}" type="datetime8">
+              <a:rPr lang="en-US" smtClean="0">
+                <a:solidFill>
+                  <a:prstClr val="black"/>
+                </a:solidFill>
+              </a:rPr>
+              <a:t>9/28/15 1:26 PM</a:t>
+            </a:fld>
+            <a:endParaRPr lang="en-US" dirty="0">
+              <a:solidFill>
+                <a:prstClr val="black"/>
+              </a:solidFill>
+            </a:endParaRPr>
+          </a:p>
+        </p:txBody>
+      </p:sp>
+      <p:sp>
+        <p:nvSpPr>
+          <p:cNvPr id="7" name="Slide Number Placeholder 6"/>
+          <p:cNvSpPr>
+            <a:spLocks noGrp="1"/>
+          </p:cNvSpPr>
+          <p:nvPr>
+            <p:ph type="sldNum" sz="quarter" idx="13"/>
+          </p:nvPr>
+        </p:nvSpPr>
+        <p:spPr/>
+        <p:txBody>
+          <a:bodyPr/>
+          <a:lstStyle/>
+          <a:p>
+            <a:fld id="{EC87E0CF-87F6-4B58-B8B8-DCAB2DAAF3CA}" type="slidenum">
+              <a:rPr lang="en-US" smtClean="0">
+                <a:solidFill>
+                  <a:prstClr val="black"/>
+                </a:solidFill>
+              </a:rPr>
+              <a:pPr/>
+              <a:t>29</a:t>
+            </a:fld>
+            <a:endParaRPr lang="en-US" dirty="0">
+              <a:solidFill>
+                <a:prstClr val="black"/>
+              </a:solidFill>
+            </a:endParaRPr>
+          </a:p>
+        </p:txBody>
+      </p:sp>
+      <p:sp>
+        <p:nvSpPr>
+          <p:cNvPr id="6" name="Footer Placeholder 5"/>
+          <p:cNvSpPr>
+            <a:spLocks noGrp="1"/>
+          </p:cNvSpPr>
+          <p:nvPr>
+            <p:ph type="ftr" sz="quarter" idx="14"/>
+          </p:nvPr>
+        </p:nvSpPr>
+        <p:spPr/>
+        <p:txBody>
+          <a:bodyPr/>
+          <a:lstStyle/>
+          <a:p>
+            <a:pPr defTabSz="914099" eaLnBrk="0" hangingPunct="0"/>
+            <a:r>
+              <a:rPr lang="en-US" sz="400" smtClean="0">
+                <a:gradFill>
+                  <a:gsLst>
+                    <a:gs pos="0">
+                      <a:prstClr val="black"/>
+                    </a:gs>
+                    <a:gs pos="100000">
+                      <a:prstClr val="black"/>
+                    </a:gs>
+                  </a:gsLst>
+                  <a:lin ang="5400000" scaled="0"/>
+                </a:gradFill>
+                <a:latin typeface="Segoe UI" pitchFamily="34" charset="0"/>
+                <a:ea typeface="Segoe UI" pitchFamily="34" charset="0"/>
+                <a:cs typeface="Segoe UI" pitchFamily="34" charset="0"/>
+              </a:rPr>
+              <a:t>© 2014 Microsoft Corporation. All rights reserved. MICROSOFT MAKES NO WARRANTIES, EXPRESS, IMPLIED OR STATUTORY, AS TO THE INFORMATION IN THIS PRESENTATION.</a:t>
+            </a:r>
+            <a:endParaRPr lang="en-US" sz="400" dirty="0" smtClean="0">
+              <a:gradFill>
+                <a:gsLst>
+                  <a:gs pos="0">
+                    <a:prstClr val="black"/>
+                  </a:gs>
+                  <a:gs pos="100000">
+                    <a:prstClr val="black"/>
+                  </a:gs>
+                </a:gsLst>
+                <a:lin ang="5400000" scaled="0"/>
+              </a:gradFill>
+              <a:latin typeface="Segoe UI" pitchFamily="34" charset="0"/>
+              <a:ea typeface="Segoe UI" pitchFamily="34" charset="0"/>
+              <a:cs typeface="Segoe UI" pitchFamily="34" charset="0"/>
+            </a:endParaRPr>
+          </a:p>
+        </p:txBody>
+      </p:sp>
+    </p:spTree>
+    <p:extLst>
+      <p:ext uri="{BB962C8B-B14F-4D97-AF65-F5344CB8AC3E}">
+        <p14:creationId xmlns:p14="http://schemas.microsoft.com/office/powerpoint/2010/main" val="2861498552"/>
       </p:ext>
     </p:extLst>
   </p:cSld>
@@ -3422,9 +4152,9 @@
           <a:bodyPr/>
           <a:lstStyle/>
           <a:p>
-            <a:fld id="{7D10C09F-FCA1-48C8-B40D-42E1045D109E}" type="datetime8">
+            <a:fld id="{90EC29EE-A8AD-4CE0-9C0B-116E0D4D7533}" type="datetime8">
               <a:rPr lang="en-US" smtClean="0"/>
-              <a:t>9/28/15 1:45 PM</a:t>
+              <a:t>9/28/15 5:40 PM</a:t>
             </a:fld>
             <a:endParaRPr lang="en-US" dirty="0"/>
           </a:p>
@@ -3457,7 +4187,7 @@
     </p:spTree>
     <p:extLst>
       <p:ext uri="{BB962C8B-B14F-4D97-AF65-F5344CB8AC3E}">
-        <p14:creationId xmlns:p14="http://schemas.microsoft.com/office/powerpoint/2010/main" val="1662190510"/>
+        <p14:creationId xmlns:p14="http://schemas.microsoft.com/office/powerpoint/2010/main" val="1855151054"/>
       </p:ext>
     </p:extLst>
   </p:cSld>
@@ -3605,7 +4335,7 @@
           <a:p>
             <a:fld id="{90EC29EE-A8AD-4CE0-9C0B-116E0D4D7533}" type="datetime8">
               <a:rPr lang="en-US" smtClean="0"/>
-              <a:t>9/28/15 5:17 PM</a:t>
+              <a:t>9/28/15 6:13 PM</a:t>
             </a:fld>
             <a:endParaRPr lang="en-US" dirty="0"/>
           </a:p>
@@ -3638,7 +4368,7 @@
     </p:spTree>
     <p:extLst>
       <p:ext uri="{BB962C8B-B14F-4D97-AF65-F5344CB8AC3E}">
-        <p14:creationId xmlns:p14="http://schemas.microsoft.com/office/powerpoint/2010/main" val="50118722"/>
+        <p14:creationId xmlns:p14="http://schemas.microsoft.com/office/powerpoint/2010/main" val="351145326"/>
       </p:ext>
     </p:extLst>
   </p:cSld>
@@ -3786,7 +4516,7 @@
           <a:p>
             <a:fld id="{90EC29EE-A8AD-4CE0-9C0B-116E0D4D7533}" type="datetime8">
               <a:rPr lang="en-US" smtClean="0"/>
-              <a:t>9/28/15 4:58 PM</a:t>
+              <a:t>9/28/15 5:40 PM</a:t>
             </a:fld>
             <a:endParaRPr lang="en-US" dirty="0"/>
           </a:p>
@@ -3819,7 +4549,7 @@
     </p:spTree>
     <p:extLst>
       <p:ext uri="{BB962C8B-B14F-4D97-AF65-F5344CB8AC3E}">
-        <p14:creationId xmlns:p14="http://schemas.microsoft.com/office/powerpoint/2010/main" val="309300845"/>
+        <p14:creationId xmlns:p14="http://schemas.microsoft.com/office/powerpoint/2010/main" val="406969579"/>
       </p:ext>
     </p:extLst>
   </p:cSld>
@@ -19924,7 +20654,7 @@
           <a:p>
             <a:r>
               <a:rPr lang="en-US" dirty="0" smtClean="0"/>
-              <a:t>Where we were</a:t>
+              <a:t>When we last left our hero…</a:t>
             </a:r>
             <a:endParaRPr lang="en-US" dirty="0"/>
           </a:p>
@@ -19943,7 +20673,7 @@
         <p:spPr>
           <a:xfrm>
             <a:off x="274638" y="1212850"/>
-            <a:ext cx="11887200" cy="4124206"/>
+            <a:ext cx="11887200" cy="4462760"/>
           </a:xfrm>
         </p:spPr>
         <p:txBody>
@@ -19952,7 +20682,7 @@
           <a:p>
             <a:r>
               <a:rPr lang="en-US" dirty="0" smtClean="0"/>
-              <a:t>MSDN/</a:t>
+              <a:t>It was publishing developer content on MSDN/</a:t>
             </a:r>
             <a:r>
               <a:rPr lang="en-US" dirty="0" err="1" smtClean="0"/>
@@ -20006,19 +20736,16 @@
           <a:p>
             <a:r>
               <a:rPr lang="en-US" dirty="0" smtClean="0"/>
-              <a:t>Rebuilt </a:t>
+              <a:t>Releasing typically every three months…</a:t>
             </a:r>
           </a:p>
           <a:p>
             <a:pPr lvl="1"/>
             <a:r>
               <a:rPr lang="en-US" dirty="0" smtClean="0"/>
-              <a:t>Size </a:t>
-            </a:r>
-            <a:r>
-              <a:rPr lang="en-US" dirty="0" smtClean="0"/>
-              <a:t>20pt for the subtopics</a:t>
-            </a:r>
+              <a:t>Conversion from XML to HTML was massive undertaking…. </a:t>
+            </a:r>
+            <a:endParaRPr lang="en-US" dirty="0" smtClean="0"/>
           </a:p>
           <a:p>
             <a:pPr lvl="1"/>
@@ -20030,23 +20757,30 @@
           <a:p>
             <a:r>
               <a:rPr lang="en-US" dirty="0" smtClean="0"/>
-              <a:t>Main topic 3: size 40pt</a:t>
-            </a:r>
+              <a:t>Pipeline was custom software</a:t>
+            </a:r>
+            <a:endParaRPr lang="en-US" dirty="0" smtClean="0"/>
           </a:p>
           <a:p>
             <a:pPr lvl="1"/>
             <a:r>
               <a:rPr lang="en-US" dirty="0" smtClean="0"/>
-              <a:t>Size 20pt for the subtopics</a:t>
+              <a:t>Expensive to build</a:t>
             </a:r>
           </a:p>
           <a:p>
             <a:pPr lvl="1"/>
             <a:r>
               <a:rPr lang="en-US" dirty="0" smtClean="0"/>
-              <a:t>Size 20pt for the subtopics</a:t>
-            </a:r>
-            <a:endParaRPr lang="en-US" dirty="0"/>
+              <a:t>More expensive to maintain</a:t>
+            </a:r>
+          </a:p>
+          <a:p>
+            <a:pPr lvl="1"/>
+            <a:r>
+              <a:rPr lang="en-US" dirty="0" smtClean="0"/>
+              <a:t>Per Dilbert specifications, it was out of date prior to release.</a:t>
+            </a:r>
           </a:p>
         </p:txBody>
       </p:sp>
@@ -20101,6 +20835,971 @@
       </p:grpSpPr>
       <p:sp>
         <p:nvSpPr>
+          <p:cNvPr id="17" name="Title 16"/>
+          <p:cNvSpPr>
+            <a:spLocks noGrp="1"/>
+          </p:cNvSpPr>
+          <p:nvPr>
+            <p:ph type="title"/>
+          </p:nvPr>
+        </p:nvSpPr>
+        <p:spPr/>
+        <p:txBody>
+          <a:bodyPr/>
+          <a:lstStyle/>
+          <a:p>
+            <a:r>
+              <a:rPr lang="en-US" dirty="0" smtClean="0"/>
+              <a:t>It was great for a lot of work…Really! </a:t>
+            </a:r>
+            <a:endParaRPr lang="en-US" dirty="0"/>
+          </a:p>
+        </p:txBody>
+      </p:sp>
+      <p:pic>
+        <p:nvPicPr>
+          <p:cNvPr id="4" name="Picture 4" descr="ttp://www.secretgeek.net/image/angrybaby.jpg"/>
+          <p:cNvPicPr>
+            <a:picLocks noChangeAspect="1" noChangeArrowheads="1"/>
+          </p:cNvPicPr>
+          <p:nvPr/>
+        </p:nvPicPr>
+        <p:blipFill>
+          <a:blip r:embed="rId3">
+            <a:extLst>
+              <a:ext uri="{28A0092B-C50C-407E-A947-70E740481C1C}">
+                <a14:useLocalDpi xmlns:a14="http://schemas.microsoft.com/office/drawing/2010/main" val="0"/>
+              </a:ext>
+            </a:extLst>
+          </a:blip>
+          <a:srcRect/>
+          <a:stretch>
+            <a:fillRect/>
+          </a:stretch>
+        </p:blipFill>
+        <p:spPr bwMode="auto">
+          <a:xfrm>
+            <a:off x="4559261" y="4282069"/>
+            <a:ext cx="2381250" cy="1790700"/>
+          </a:xfrm>
+          <a:prstGeom prst="rect">
+            <a:avLst/>
+          </a:prstGeom>
+          <a:noFill/>
+          <a:extLst>
+            <a:ext uri="{909E8E84-426E-40DD-AFC4-6F175D3DCCD1}">
+              <a14:hiddenFill xmlns:a14="http://schemas.microsoft.com/office/drawing/2010/main">
+                <a:solidFill>
+                  <a:srgbClr val="FFFFFF"/>
+                </a:solidFill>
+              </a14:hiddenFill>
+            </a:ext>
+          </a:extLst>
+        </p:spPr>
+      </p:pic>
+      <p:pic>
+        <p:nvPicPr>
+          <p:cNvPr id="2050" name="Picture 2" descr="http://osiprodeusodcspstoa01.blob.core.windows.net/en-us/media/8b52adbd-adf2-45b7-88c1-874510dc00ae.png"/>
+          <p:cNvPicPr>
+            <a:picLocks noChangeAspect="1" noChangeArrowheads="1"/>
+          </p:cNvPicPr>
+          <p:nvPr/>
+        </p:nvPicPr>
+        <p:blipFill>
+          <a:blip r:embed="rId4">
+            <a:extLst>
+              <a:ext uri="{28A0092B-C50C-407E-A947-70E740481C1C}">
+                <a14:useLocalDpi xmlns:a14="http://schemas.microsoft.com/office/drawing/2010/main" val="0"/>
+              </a:ext>
+            </a:extLst>
+          </a:blip>
+          <a:srcRect/>
+          <a:stretch>
+            <a:fillRect/>
+          </a:stretch>
+        </p:blipFill>
+        <p:spPr bwMode="auto">
+          <a:xfrm>
+            <a:off x="3717073" y="1315844"/>
+            <a:ext cx="3095625" cy="1543050"/>
+          </a:xfrm>
+          <a:prstGeom prst="rect">
+            <a:avLst/>
+          </a:prstGeom>
+          <a:noFill/>
+          <a:extLst>
+            <a:ext uri="{909E8E84-426E-40DD-AFC4-6F175D3DCCD1}">
+              <a14:hiddenFill xmlns:a14="http://schemas.microsoft.com/office/drawing/2010/main">
+                <a:solidFill>
+                  <a:srgbClr val="FFFFFF"/>
+                </a:solidFill>
+              </a14:hiddenFill>
+            </a:ext>
+          </a:extLst>
+        </p:spPr>
+      </p:pic>
+      <p:sp>
+        <p:nvSpPr>
+          <p:cNvPr id="2" name="TextBox 1"/>
+          <p:cNvSpPr txBox="1"/>
+          <p:nvPr/>
+        </p:nvSpPr>
+        <p:spPr>
+          <a:xfrm>
+            <a:off x="542693" y="3367668"/>
+            <a:ext cx="9508273" cy="627864"/>
+          </a:xfrm>
+          <a:prstGeom prst="rect">
+            <a:avLst/>
+          </a:prstGeom>
+          <a:noFill/>
+        </p:spPr>
+        <p:txBody>
+          <a:bodyPr wrap="square" lIns="182880" tIns="146304" rIns="182880" bIns="146304" rtlCol="0">
+            <a:spAutoFit/>
+          </a:bodyPr>
+          <a:lstStyle/>
+          <a:p>
+            <a:pPr>
+              <a:lnSpc>
+                <a:spcPct val="90000"/>
+              </a:lnSpc>
+              <a:spcAft>
+                <a:spcPts val="600"/>
+              </a:spcAft>
+            </a:pPr>
+            <a:r>
+              <a:rPr lang="en-US" sz="2400" dirty="0" smtClean="0">
+                <a:gradFill>
+                  <a:gsLst>
+                    <a:gs pos="2917">
+                      <a:schemeClr val="tx1"/>
+                    </a:gs>
+                    <a:gs pos="30000">
+                      <a:schemeClr val="tx1"/>
+                    </a:gs>
+                  </a:gsLst>
+                  <a:lin ang="5400000" scaled="0"/>
+                </a:gradFill>
+              </a:rPr>
+              <a:t>But as the number of reviewers and articles grew, eventually…</a:t>
+            </a:r>
+            <a:endParaRPr lang="en-US" sz="2400" dirty="0" smtClean="0">
+              <a:gradFill>
+                <a:gsLst>
+                  <a:gs pos="2917">
+                    <a:schemeClr val="tx1"/>
+                  </a:gs>
+                  <a:gs pos="30000">
+                    <a:schemeClr val="tx1"/>
+                  </a:gs>
+                </a:gsLst>
+                <a:lin ang="5400000" scaled="0"/>
+              </a:gradFill>
+            </a:endParaRPr>
+          </a:p>
+        </p:txBody>
+      </p:sp>
+    </p:spTree>
+    <p:extLst>
+      <p:ext uri="{BB962C8B-B14F-4D97-AF65-F5344CB8AC3E}">
+        <p14:creationId xmlns:p14="http://schemas.microsoft.com/office/powerpoint/2010/main" val="565251105"/>
+      </p:ext>
+    </p:extLst>
+  </p:cSld>
+  <p:clrMapOvr>
+    <a:masterClrMapping/>
+  </p:clrMapOvr>
+  <mc:AlternateContent xmlns:mc="http://schemas.openxmlformats.org/markup-compatibility/2006" xmlns:p14="http://schemas.microsoft.com/office/powerpoint/2010/main">
+    <mc:Choice Requires="p14">
+      <p:transition spd="med" p14:dur="700">
+        <p:fade/>
+      </p:transition>
+    </mc:Choice>
+    <mc:Fallback xmlns="">
+      <p:transition spd="med">
+        <p:fade/>
+      </p:transition>
+    </mc:Fallback>
+  </mc:AlternateContent>
+  <p:timing>
+    <p:tnLst>
+      <p:par>
+        <p:cTn id="1" dur="indefinite" restart="never" nodeType="tmRoot">
+          <p:childTnLst>
+            <p:seq concurrent="1" nextAc="seek">
+              <p:cTn id="2" dur="indefinite" nodeType="mainSeq">
+                <p:childTnLst>
+                  <p:par>
+                    <p:cTn id="3" fill="hold">
+                      <p:stCondLst>
+                        <p:cond delay="indefinite"/>
+                      </p:stCondLst>
+                      <p:childTnLst>
+                        <p:par>
+                          <p:cTn id="4" fill="hold">
+                            <p:stCondLst>
+                              <p:cond delay="0"/>
+                            </p:stCondLst>
+                            <p:childTnLst>
+                              <p:par>
+                                <p:cTn id="5" presetID="2" presetClass="entr" presetSubtype="4" fill="hold" grpId="0" nodeType="clickEffect">
+                                  <p:stCondLst>
+                                    <p:cond delay="0"/>
+                                  </p:stCondLst>
+                                  <p:childTnLst>
+                                    <p:set>
+                                      <p:cBhvr>
+                                        <p:cTn id="6" dur="1" fill="hold">
+                                          <p:stCondLst>
+                                            <p:cond delay="0"/>
+                                          </p:stCondLst>
+                                        </p:cTn>
+                                        <p:tgtEl>
+                                          <p:spTgt spid="2"/>
+                                        </p:tgtEl>
+                                        <p:attrNameLst>
+                                          <p:attrName>style.visibility</p:attrName>
+                                        </p:attrNameLst>
+                                      </p:cBhvr>
+                                      <p:to>
+                                        <p:strVal val="visible"/>
+                                      </p:to>
+                                    </p:set>
+                                    <p:anim calcmode="lin" valueType="num">
+                                      <p:cBhvr additive="base">
+                                        <p:cTn id="7" dur="500" fill="hold"/>
+                                        <p:tgtEl>
+                                          <p:spTgt spid="2"/>
+                                        </p:tgtEl>
+                                        <p:attrNameLst>
+                                          <p:attrName>ppt_x</p:attrName>
+                                        </p:attrNameLst>
+                                      </p:cBhvr>
+                                      <p:tavLst>
+                                        <p:tav tm="0">
+                                          <p:val>
+                                            <p:strVal val="#ppt_x"/>
+                                          </p:val>
+                                        </p:tav>
+                                        <p:tav tm="100000">
+                                          <p:val>
+                                            <p:strVal val="#ppt_x"/>
+                                          </p:val>
+                                        </p:tav>
+                                      </p:tavLst>
+                                    </p:anim>
+                                    <p:anim calcmode="lin" valueType="num">
+                                      <p:cBhvr additive="base">
+                                        <p:cTn id="8" dur="500" fill="hold"/>
+                                        <p:tgtEl>
+                                          <p:spTgt spid="2"/>
+                                        </p:tgtEl>
+                                        <p:attrNameLst>
+                                          <p:attrName>ppt_y</p:attrName>
+                                        </p:attrNameLst>
+                                      </p:cBhvr>
+                                      <p:tavLst>
+                                        <p:tav tm="0">
+                                          <p:val>
+                                            <p:strVal val="1+#ppt_h/2"/>
+                                          </p:val>
+                                        </p:tav>
+                                        <p:tav tm="100000">
+                                          <p:val>
+                                            <p:strVal val="#ppt_y"/>
+                                          </p:val>
+                                        </p:tav>
+                                      </p:tavLst>
+                                    </p:anim>
+                                  </p:childTnLst>
+                                </p:cTn>
+                              </p:par>
+                            </p:childTnLst>
+                          </p:cTn>
+                        </p:par>
+                      </p:childTnLst>
+                    </p:cTn>
+                  </p:par>
+                  <p:par>
+                    <p:cTn id="9" fill="hold">
+                      <p:stCondLst>
+                        <p:cond delay="indefinite"/>
+                      </p:stCondLst>
+                      <p:childTnLst>
+                        <p:par>
+                          <p:cTn id="10" fill="hold">
+                            <p:stCondLst>
+                              <p:cond delay="0"/>
+                            </p:stCondLst>
+                            <p:childTnLst>
+                              <p:par>
+                                <p:cTn id="11" presetID="10" presetClass="entr" presetSubtype="0" fill="hold" nodeType="clickEffect">
+                                  <p:stCondLst>
+                                    <p:cond delay="0"/>
+                                  </p:stCondLst>
+                                  <p:childTnLst>
+                                    <p:set>
+                                      <p:cBhvr>
+                                        <p:cTn id="12" dur="1" fill="hold">
+                                          <p:stCondLst>
+                                            <p:cond delay="0"/>
+                                          </p:stCondLst>
+                                        </p:cTn>
+                                        <p:tgtEl>
+                                          <p:spTgt spid="4"/>
+                                        </p:tgtEl>
+                                        <p:attrNameLst>
+                                          <p:attrName>style.visibility</p:attrName>
+                                        </p:attrNameLst>
+                                      </p:cBhvr>
+                                      <p:to>
+                                        <p:strVal val="visible"/>
+                                      </p:to>
+                                    </p:set>
+                                    <p:animEffect transition="in" filter="fade">
+                                      <p:cBhvr>
+                                        <p:cTn id="13" dur="2000"/>
+                                        <p:tgtEl>
+                                          <p:spTgt spid="4"/>
+                                        </p:tgtEl>
+                                      </p:cBhvr>
+                                    </p:animEffect>
+                                  </p:childTnLst>
+                                </p:cTn>
+                              </p:par>
+                            </p:childTnLst>
+                          </p:cTn>
+                        </p:par>
+                      </p:childTnLst>
+                    </p:cTn>
+                  </p:par>
+                  <p:par>
+                    <p:cTn id="14" fill="hold">
+                      <p:stCondLst>
+                        <p:cond delay="indefinite"/>
+                      </p:stCondLst>
+                      <p:childTnLst>
+                        <p:par>
+                          <p:cTn id="15" fill="hold">
+                            <p:stCondLst>
+                              <p:cond delay="0"/>
+                            </p:stCondLst>
+                            <p:childTnLst>
+                              <p:par>
+                                <p:cTn id="16" presetID="6" presetClass="emph" presetSubtype="0" fill="hold" nodeType="clickEffect">
+                                  <p:stCondLst>
+                                    <p:cond delay="0"/>
+                                  </p:stCondLst>
+                                  <p:childTnLst>
+                                    <p:animScale>
+                                      <p:cBhvr>
+                                        <p:cTn id="17" dur="2000" fill="hold"/>
+                                        <p:tgtEl>
+                                          <p:spTgt spid="4"/>
+                                        </p:tgtEl>
+                                      </p:cBhvr>
+                                      <p:by x="400000" y="400000"/>
+                                    </p:animScale>
+                                  </p:childTnLst>
+                                </p:cTn>
+                              </p:par>
+                            </p:childTnLst>
+                          </p:cTn>
+                        </p:par>
+                      </p:childTnLst>
+                    </p:cTn>
+                  </p:par>
+                </p:childTnLst>
+              </p:cTn>
+              <p:prevCondLst>
+                <p:cond evt="onPrev" delay="0">
+                  <p:tgtEl>
+                    <p:sldTgt/>
+                  </p:tgtEl>
+                </p:cond>
+              </p:prevCondLst>
+              <p:nextCondLst>
+                <p:cond evt="onNext" delay="0">
+                  <p:tgtEl>
+                    <p:sldTgt/>
+                  </p:tgtEl>
+                </p:cond>
+              </p:nextCondLst>
+            </p:seq>
+          </p:childTnLst>
+        </p:cTn>
+      </p:par>
+    </p:tnLst>
+    <p:bldLst>
+      <p:bldP spid="2" grpId="0"/>
+    </p:bldLst>
+  </p:timing>
+</p:sld>
+</file>
+
+<file path=ppt/slides/slide17.xml><?xml version="1.0" encoding="utf-8"?>
+<p:sld xmlns:a="http://schemas.openxmlformats.org/drawingml/2006/main" xmlns:r="http://schemas.openxmlformats.org/officeDocument/2006/relationships" xmlns:p="http://schemas.openxmlformats.org/presentationml/2006/main">
+  <p:cSld>
+    <p:spTree>
+      <p:nvGrpSpPr>
+        <p:cNvPr id="1" name=""/>
+        <p:cNvGrpSpPr/>
+        <p:nvPr/>
+      </p:nvGrpSpPr>
+      <p:grpSpPr>
+        <a:xfrm>
+          <a:off x="0" y="0"/>
+          <a:ext cx="0" cy="0"/>
+          <a:chOff x="0" y="0"/>
+          <a:chExt cx="0" cy="0"/>
+        </a:xfrm>
+      </p:grpSpPr>
+      <p:sp>
+        <p:nvSpPr>
+          <p:cNvPr id="17" name="Title 16"/>
+          <p:cNvSpPr>
+            <a:spLocks noGrp="1"/>
+          </p:cNvSpPr>
+          <p:nvPr>
+            <p:ph type="title"/>
+          </p:nvPr>
+        </p:nvSpPr>
+        <p:spPr>
+          <a:xfrm>
+            <a:off x="415887" y="1306318"/>
+            <a:ext cx="11889564" cy="1384843"/>
+          </a:xfrm>
+        </p:spPr>
+        <p:txBody>
+          <a:bodyPr/>
+          <a:lstStyle/>
+          <a:p>
+            <a:pPr marL="0" marR="0" lvl="1" indent="0" algn="l" defTabSz="932742" rtl="0" eaLnBrk="1" fontAlgn="auto" latinLnBrk="0" hangingPunct="1">
+              <a:lnSpc>
+                <a:spcPct val="90000"/>
+              </a:lnSpc>
+              <a:spcBef>
+                <a:spcPct val="20000"/>
+              </a:spcBef>
+              <a:spcAft>
+                <a:spcPts val="0"/>
+              </a:spcAft>
+              <a:buClrTx/>
+              <a:buSzPct val="90000"/>
+              <a:buFontTx/>
+              <a:buNone/>
+              <a:tabLst/>
+              <a:defRPr/>
+            </a:pPr>
+            <a:r>
+              <a:rPr kumimoji="0" lang="en-US" sz="4000" b="0" i="0" u="none" strike="noStrike" kern="1200" cap="none" spc="0" normalizeH="0" baseline="0" noProof="0" dirty="0" smtClean="0">
+                <a:ln>
+                  <a:noFill/>
+                </a:ln>
+                <a:gradFill>
+                  <a:gsLst>
+                    <a:gs pos="1250">
+                      <a:srgbClr val="FFFFFF"/>
+                    </a:gs>
+                    <a:gs pos="100000">
+                      <a:srgbClr val="FFFFFF"/>
+                    </a:gs>
+                  </a:gsLst>
+                  <a:lin ang="5400000" scaled="0"/>
+                </a:gradFill>
+                <a:effectLst/>
+                <a:uLnTx/>
+                <a:uFillTx/>
+                <a:latin typeface="Segoe UI"/>
+                <a:ea typeface=""/>
+                <a:cs typeface=""/>
+              </a:rPr>
+              <a:t>Not one system was built to handle the speed or scale of what we would become</a:t>
+            </a:r>
+          </a:p>
+        </p:txBody>
+      </p:sp>
+      <p:sp>
+        <p:nvSpPr>
+          <p:cNvPr id="2" name="TextBox 1"/>
+          <p:cNvSpPr txBox="1"/>
+          <p:nvPr/>
+        </p:nvSpPr>
+        <p:spPr>
+          <a:xfrm>
+            <a:off x="252761" y="408878"/>
+            <a:ext cx="8014010" cy="627864"/>
+          </a:xfrm>
+          <a:prstGeom prst="rect">
+            <a:avLst/>
+          </a:prstGeom>
+          <a:noFill/>
+        </p:spPr>
+        <p:txBody>
+          <a:bodyPr wrap="square" lIns="182880" tIns="146304" rIns="182880" bIns="146304" rtlCol="0">
+            <a:spAutoFit/>
+          </a:bodyPr>
+          <a:lstStyle/>
+          <a:p>
+            <a:pPr>
+              <a:lnSpc>
+                <a:spcPct val="90000"/>
+              </a:lnSpc>
+              <a:spcAft>
+                <a:spcPts val="600"/>
+              </a:spcAft>
+            </a:pPr>
+            <a:r>
+              <a:rPr lang="en-US" sz="2400" dirty="0" smtClean="0">
+                <a:gradFill>
+                  <a:gsLst>
+                    <a:gs pos="2917">
+                      <a:schemeClr val="tx1"/>
+                    </a:gs>
+                    <a:gs pos="30000">
+                      <a:schemeClr val="tx1"/>
+                    </a:gs>
+                  </a:gsLst>
+                  <a:lin ang="5400000" scaled="0"/>
+                </a:gradFill>
+              </a:rPr>
+              <a:t>Standard systems issue:</a:t>
+            </a:r>
+            <a:endParaRPr lang="en-US" sz="2400" dirty="0" smtClean="0">
+              <a:gradFill>
+                <a:gsLst>
+                  <a:gs pos="2917">
+                    <a:schemeClr val="tx1"/>
+                  </a:gs>
+                  <a:gs pos="30000">
+                    <a:schemeClr val="tx1"/>
+                  </a:gs>
+                </a:gsLst>
+                <a:lin ang="5400000" scaled="0"/>
+              </a:gradFill>
+            </a:endParaRPr>
+          </a:p>
+        </p:txBody>
+      </p:sp>
+    </p:spTree>
+    <p:extLst>
+      <p:ext uri="{BB962C8B-B14F-4D97-AF65-F5344CB8AC3E}">
+        <p14:creationId xmlns:p14="http://schemas.microsoft.com/office/powerpoint/2010/main" val="988346353"/>
+      </p:ext>
+    </p:extLst>
+  </p:cSld>
+  <p:clrMapOvr>
+    <a:masterClrMapping/>
+  </p:clrMapOvr>
+  <mc:AlternateContent xmlns:mc="http://schemas.openxmlformats.org/markup-compatibility/2006" xmlns:p14="http://schemas.microsoft.com/office/powerpoint/2010/main">
+    <mc:Choice Requires="p14">
+      <p:transition spd="med" p14:dur="700">
+        <p:fade/>
+      </p:transition>
+    </mc:Choice>
+    <mc:Fallback xmlns="">
+      <p:transition spd="med">
+        <p:fade/>
+      </p:transition>
+    </mc:Fallback>
+  </mc:AlternateContent>
+  <p:timing>
+    <p:tnLst>
+      <p:par>
+        <p:cTn id="1" dur="indefinite" restart="never" nodeType="tmRoot">
+          <p:childTnLst>
+            <p:seq concurrent="1" nextAc="seek">
+              <p:cTn id="2" dur="indefinite" nodeType="mainSeq">
+                <p:childTnLst>
+                  <p:par>
+                    <p:cTn id="3" fill="hold">
+                      <p:stCondLst>
+                        <p:cond delay="indefinite"/>
+                      </p:stCondLst>
+                      <p:childTnLst>
+                        <p:par>
+                          <p:cTn id="4" fill="hold">
+                            <p:stCondLst>
+                              <p:cond delay="0"/>
+                            </p:stCondLst>
+                            <p:childTnLst>
+                              <p:par>
+                                <p:cTn id="5" presetID="10" presetClass="entr" presetSubtype="0" fill="hold" grpId="0" nodeType="clickEffect">
+                                  <p:stCondLst>
+                                    <p:cond delay="0"/>
+                                  </p:stCondLst>
+                                  <p:childTnLst>
+                                    <p:set>
+                                      <p:cBhvr>
+                                        <p:cTn id="6" dur="1" fill="hold">
+                                          <p:stCondLst>
+                                            <p:cond delay="0"/>
+                                          </p:stCondLst>
+                                        </p:cTn>
+                                        <p:tgtEl>
+                                          <p:spTgt spid="17"/>
+                                        </p:tgtEl>
+                                        <p:attrNameLst>
+                                          <p:attrName>style.visibility</p:attrName>
+                                        </p:attrNameLst>
+                                      </p:cBhvr>
+                                      <p:to>
+                                        <p:strVal val="visible"/>
+                                      </p:to>
+                                    </p:set>
+                                    <p:animEffect transition="in" filter="fade">
+                                      <p:cBhvr>
+                                        <p:cTn id="7" dur="1000"/>
+                                        <p:tgtEl>
+                                          <p:spTgt spid="17"/>
+                                        </p:tgtEl>
+                                      </p:cBhvr>
+                                    </p:animEffect>
+                                  </p:childTnLst>
+                                </p:cTn>
+                              </p:par>
+                            </p:childTnLst>
+                          </p:cTn>
+                        </p:par>
+                      </p:childTnLst>
+                    </p:cTn>
+                  </p:par>
+                </p:childTnLst>
+              </p:cTn>
+              <p:prevCondLst>
+                <p:cond evt="onPrev" delay="0">
+                  <p:tgtEl>
+                    <p:sldTgt/>
+                  </p:tgtEl>
+                </p:cond>
+              </p:prevCondLst>
+              <p:nextCondLst>
+                <p:cond evt="onNext" delay="0">
+                  <p:tgtEl>
+                    <p:sldTgt/>
+                  </p:tgtEl>
+                </p:cond>
+              </p:nextCondLst>
+            </p:seq>
+          </p:childTnLst>
+        </p:cTn>
+      </p:par>
+    </p:tnLst>
+    <p:bldLst>
+      <p:bldP spid="17" grpId="0"/>
+    </p:bldLst>
+  </p:timing>
+</p:sld>
+</file>
+
+<file path=ppt/slides/slide18.xml><?xml version="1.0" encoding="utf-8"?>
+<p:sld xmlns:a="http://schemas.openxmlformats.org/drawingml/2006/main" xmlns:r="http://schemas.openxmlformats.org/officeDocument/2006/relationships" xmlns:p="http://schemas.openxmlformats.org/presentationml/2006/main">
+  <p:cSld>
+    <p:spTree>
+      <p:nvGrpSpPr>
+        <p:cNvPr id="1" name=""/>
+        <p:cNvGrpSpPr/>
+        <p:nvPr/>
+      </p:nvGrpSpPr>
+      <p:grpSpPr>
+        <a:xfrm>
+          <a:off x="0" y="0"/>
+          <a:ext cx="0" cy="0"/>
+          <a:chOff x="0" y="0"/>
+          <a:chExt cx="0" cy="0"/>
+        </a:xfrm>
+      </p:grpSpPr>
+      <p:sp>
+        <p:nvSpPr>
+          <p:cNvPr id="17" name="Title 16"/>
+          <p:cNvSpPr>
+            <a:spLocks noGrp="1"/>
+          </p:cNvSpPr>
+          <p:nvPr>
+            <p:ph type="title"/>
+          </p:nvPr>
+        </p:nvSpPr>
+        <p:spPr/>
+        <p:txBody>
+          <a:bodyPr/>
+          <a:lstStyle/>
+          <a:p>
+            <a:r>
+              <a:rPr lang="en-US" dirty="0" smtClean="0"/>
+              <a:t>Digression: The explosion of words	</a:t>
+            </a:r>
+            <a:endParaRPr lang="en-US" dirty="0"/>
+          </a:p>
+        </p:txBody>
+      </p:sp>
+      <p:sp>
+        <p:nvSpPr>
+          <p:cNvPr id="6" name="Text Placeholder 5"/>
+          <p:cNvSpPr>
+            <a:spLocks noGrp="1"/>
+          </p:cNvSpPr>
+          <p:nvPr>
+            <p:ph type="body" sz="quarter" idx="10"/>
+          </p:nvPr>
+        </p:nvSpPr>
+        <p:spPr>
+          <a:xfrm>
+            <a:off x="274638" y="1212850"/>
+            <a:ext cx="11887200" cy="3200876"/>
+          </a:xfrm>
+        </p:spPr>
+        <p:txBody>
+          <a:bodyPr/>
+          <a:lstStyle/>
+          <a:p>
+            <a:r>
+              <a:rPr lang="en-US" dirty="0" smtClean="0"/>
+              <a:t>Community-written software demonstrated quality and scale</a:t>
+            </a:r>
+          </a:p>
+          <a:p>
+            <a:r>
+              <a:rPr lang="en-US" dirty="0" smtClean="0"/>
+              <a:t>Speed of features increased radically</a:t>
+            </a:r>
+          </a:p>
+          <a:p>
+            <a:r>
+              <a:rPr lang="en-US" dirty="0" smtClean="0"/>
+              <a:t>Huge new audiences sizes (Windows, Linux, Android, Mac, iOS)</a:t>
+            </a:r>
+          </a:p>
+        </p:txBody>
+      </p:sp>
+    </p:spTree>
+    <p:extLst>
+      <p:ext uri="{BB962C8B-B14F-4D97-AF65-F5344CB8AC3E}">
+        <p14:creationId xmlns:p14="http://schemas.microsoft.com/office/powerpoint/2010/main" val="1071274461"/>
+      </p:ext>
+    </p:extLst>
+  </p:cSld>
+  <p:clrMapOvr>
+    <a:masterClrMapping/>
+  </p:clrMapOvr>
+  <mc:AlternateContent xmlns:mc="http://schemas.openxmlformats.org/markup-compatibility/2006" xmlns:p14="http://schemas.microsoft.com/office/powerpoint/2010/main">
+    <mc:Choice Requires="p14">
+      <p:transition spd="med" p14:dur="700">
+        <p:fade/>
+      </p:transition>
+    </mc:Choice>
+    <mc:Fallback xmlns="">
+      <p:transition spd="med">
+        <p:fade/>
+      </p:transition>
+    </mc:Fallback>
+  </mc:AlternateContent>
+  <p:timing>
+    <p:tnLst>
+      <p:par>
+        <p:cTn id="1" dur="indefinite" restart="never" nodeType="tmRoot"/>
+      </p:par>
+    </p:tnLst>
+  </p:timing>
+</p:sld>
+</file>
+
+<file path=ppt/slides/slide19.xml><?xml version="1.0" encoding="utf-8"?>
+<p:sld xmlns:a="http://schemas.openxmlformats.org/drawingml/2006/main" xmlns:r="http://schemas.openxmlformats.org/officeDocument/2006/relationships" xmlns:p="http://schemas.openxmlformats.org/presentationml/2006/main">
+  <p:cSld>
+    <p:bg>
+      <p:bgPr>
+        <a:blipFill dpi="0" rotWithShape="1">
+          <a:blip r:embed="rId3">
+            <a:lum/>
+          </a:blip>
+          <a:srcRect/>
+          <a:stretch>
+            <a:fillRect t="-7000" b="-7000"/>
+          </a:stretch>
+        </a:blipFill>
+        <a:effectLst/>
+      </p:bgPr>
+    </p:bg>
+    <p:spTree>
+      <p:nvGrpSpPr>
+        <p:cNvPr id="1" name=""/>
+        <p:cNvGrpSpPr/>
+        <p:nvPr/>
+      </p:nvGrpSpPr>
+      <p:grpSpPr>
+        <a:xfrm>
+          <a:off x="0" y="0"/>
+          <a:ext cx="0" cy="0"/>
+          <a:chOff x="0" y="0"/>
+          <a:chExt cx="0" cy="0"/>
+        </a:xfrm>
+      </p:grpSpPr>
+    </p:spTree>
+    <p:extLst>
+      <p:ext uri="{BB962C8B-B14F-4D97-AF65-F5344CB8AC3E}">
+        <p14:creationId xmlns:p14="http://schemas.microsoft.com/office/powerpoint/2010/main" val="2104336645"/>
+      </p:ext>
+    </p:extLst>
+  </p:cSld>
+  <p:clrMapOvr>
+    <a:masterClrMapping/>
+  </p:clrMapOvr>
+  <mc:AlternateContent xmlns:mc="http://schemas.openxmlformats.org/markup-compatibility/2006" xmlns:p14="http://schemas.microsoft.com/office/powerpoint/2010/main">
+    <mc:Choice Requires="p14">
+      <p:transition spd="med" p14:dur="700">
+        <p:fade/>
+      </p:transition>
+    </mc:Choice>
+    <mc:Fallback xmlns="">
+      <p:transition spd="med">
+        <p:fade/>
+      </p:transition>
+    </mc:Fallback>
+  </mc:AlternateContent>
+  <p:timing>
+    <p:tnLst>
+      <p:par>
+        <p:cTn id="1" dur="indefinite" restart="never" nodeType="tmRoot"/>
+      </p:par>
+    </p:tnLst>
+  </p:timing>
+</p:sld>
+</file>
+
+<file path=ppt/slides/slide2.xml><?xml version="1.0" encoding="utf-8"?>
+<p:sld xmlns:a="http://schemas.openxmlformats.org/drawingml/2006/main" xmlns:r="http://schemas.openxmlformats.org/officeDocument/2006/relationships" xmlns:p="http://schemas.openxmlformats.org/presentationml/2006/main">
+  <p:cSld>
+    <p:spTree>
+      <p:nvGrpSpPr>
+        <p:cNvPr id="1" name=""/>
+        <p:cNvGrpSpPr/>
+        <p:nvPr/>
+      </p:nvGrpSpPr>
+      <p:grpSpPr>
+        <a:xfrm>
+          <a:off x="0" y="0"/>
+          <a:ext cx="0" cy="0"/>
+          <a:chOff x="0" y="0"/>
+          <a:chExt cx="0" cy="0"/>
+        </a:xfrm>
+      </p:grpSpPr>
+      <p:sp>
+        <p:nvSpPr>
+          <p:cNvPr id="4" name="Title 3"/>
+          <p:cNvSpPr>
+            <a:spLocks noGrp="1"/>
+          </p:cNvSpPr>
+          <p:nvPr>
+            <p:ph type="title"/>
+          </p:nvPr>
+        </p:nvSpPr>
+        <p:spPr/>
+        <p:txBody>
+          <a:bodyPr/>
+          <a:lstStyle/>
+          <a:p>
+            <a:r>
+              <a:rPr lang="en-US" dirty="0" smtClean="0"/>
+              <a:t>Presentation title</a:t>
+            </a:r>
+            <a:br>
+              <a:rPr lang="en-US" dirty="0" smtClean="0"/>
+            </a:br>
+            <a:r>
+              <a:rPr lang="en-US" dirty="0" smtClean="0"/>
+              <a:t>goes here</a:t>
+            </a:r>
+            <a:endParaRPr lang="en-US" dirty="0"/>
+          </a:p>
+        </p:txBody>
+      </p:sp>
+      <p:sp>
+        <p:nvSpPr>
+          <p:cNvPr id="5" name="Text Placeholder 4"/>
+          <p:cNvSpPr>
+            <a:spLocks noGrp="1"/>
+          </p:cNvSpPr>
+          <p:nvPr>
+            <p:ph type="body" sz="quarter" idx="14"/>
+          </p:nvPr>
+        </p:nvSpPr>
+        <p:spPr/>
+        <p:txBody>
+          <a:bodyPr/>
+          <a:lstStyle/>
+          <a:p>
+            <a:r>
+              <a:rPr lang="en-US" dirty="0" smtClean="0"/>
+              <a:t>Speaker Name</a:t>
+            </a:r>
+          </a:p>
+          <a:p>
+            <a:r>
+              <a:rPr lang="en-US" dirty="0" smtClean="0"/>
+              <a:t>Title</a:t>
+            </a:r>
+          </a:p>
+          <a:p>
+            <a:r>
+              <a:rPr lang="en-US" dirty="0" smtClean="0"/>
+              <a:t>Microsoft IT</a:t>
+            </a:r>
+            <a:endParaRPr lang="en-US" dirty="0"/>
+          </a:p>
+        </p:txBody>
+      </p:sp>
+    </p:spTree>
+    <p:extLst>
+      <p:ext uri="{BB962C8B-B14F-4D97-AF65-F5344CB8AC3E}">
+        <p14:creationId xmlns:p14="http://schemas.microsoft.com/office/powerpoint/2010/main" val="3975204317"/>
+      </p:ext>
+    </p:extLst>
+  </p:cSld>
+  <p:clrMapOvr>
+    <a:masterClrMapping/>
+  </p:clrMapOvr>
+  <mc:AlternateContent xmlns:mc="http://schemas.openxmlformats.org/markup-compatibility/2006" xmlns:p14="http://schemas.microsoft.com/office/powerpoint/2010/main">
+    <mc:Choice Requires="p14">
+      <p:transition spd="med" p14:dur="700">
+        <p:fade/>
+      </p:transition>
+    </mc:Choice>
+    <mc:Fallback xmlns="">
+      <p:transition spd="med">
+        <p:fade/>
+      </p:transition>
+    </mc:Fallback>
+  </mc:AlternateContent>
+  <p:timing>
+    <p:tnLst>
+      <p:par>
+        <p:cTn id="1" dur="indefinite" restart="never" nodeType="tmRoot"/>
+      </p:par>
+    </p:tnLst>
+  </p:timing>
+</p:sld>
+</file>
+
+<file path=ppt/slides/slide20.xml><?xml version="1.0" encoding="utf-8"?>
+<p:sld xmlns:a="http://schemas.openxmlformats.org/drawingml/2006/main" xmlns:r="http://schemas.openxmlformats.org/officeDocument/2006/relationships" xmlns:p="http://schemas.openxmlformats.org/presentationml/2006/main">
+  <p:cSld>
+    <p:spTree>
+      <p:nvGrpSpPr>
+        <p:cNvPr id="1" name=""/>
+        <p:cNvGrpSpPr/>
+        <p:nvPr/>
+      </p:nvGrpSpPr>
+      <p:grpSpPr>
+        <a:xfrm>
+          <a:off x="0" y="0"/>
+          <a:ext cx="0" cy="0"/>
+          <a:chOff x="0" y="0"/>
+          <a:chExt cx="0" cy="0"/>
+        </a:xfrm>
+      </p:grpSpPr>
+      <p:sp>
+        <p:nvSpPr>
           <p:cNvPr id="2" name="Title 1"/>
           <p:cNvSpPr>
             <a:spLocks noGrp="1"/>
@@ -20158,7 +21857,7 @@
 </p:sld>
 </file>
 
-<file path=ppt/slides/slide17.xml><?xml version="1.0" encoding="utf-8"?>
+<file path=ppt/slides/slide21.xml><?xml version="1.0" encoding="utf-8"?>
 <p:sld xmlns:a="http://schemas.openxmlformats.org/drawingml/2006/main" xmlns:r="http://schemas.openxmlformats.org/officeDocument/2006/relationships" xmlns:p="http://schemas.openxmlformats.org/presentationml/2006/main">
   <p:cSld>
     <p:spTree>
@@ -20211,7 +21910,7 @@
         <p:spPr>
           <a:xfrm>
             <a:off x="274638" y="1212850"/>
-            <a:ext cx="11887200" cy="3785652"/>
+            <a:ext cx="11887200" cy="4124206"/>
           </a:xfrm>
         </p:spPr>
         <p:txBody>
@@ -20289,12 +21988,24 @@
             <a:pPr lvl="1"/>
             <a:r>
               <a:rPr lang="en-US" dirty="0" smtClean="0"/>
-              <a:t>Size </a:t>
+              <a:t>Nothing in the entire </a:t>
+            </a:r>
+            <a:r>
+              <a:rPr lang="en-US" dirty="0" err="1" smtClean="0"/>
+              <a:t>toolchain</a:t>
             </a:r>
             <a:r>
               <a:rPr lang="en-US" dirty="0" smtClean="0"/>
-              <a:t>20pt for the subtopics</a:t>
-            </a:r>
+              <a:t> is Windows-only</a:t>
+            </a:r>
+          </a:p>
+          <a:p>
+            <a:pPr lvl="1"/>
+            <a:r>
+              <a:rPr lang="en-US" dirty="0" smtClean="0"/>
+              <a:t>Authoring in anything that writes markdown.</a:t>
+            </a:r>
+            <a:endParaRPr lang="en-US" dirty="0" smtClean="0"/>
           </a:p>
           <a:p>
             <a:r>
@@ -20351,7 +22062,7 @@
 </p:sld>
 </file>
 
-<file path=ppt/slides/slide18.xml><?xml version="1.0" encoding="utf-8"?>
+<file path=ppt/slides/slide22.xml><?xml version="1.0" encoding="utf-8"?>
 <p:sld xmlns:a="http://schemas.openxmlformats.org/drawingml/2006/main" xmlns:r="http://schemas.openxmlformats.org/officeDocument/2006/relationships" xmlns:p="http://schemas.openxmlformats.org/presentationml/2006/main">
   <p:cSld>
     <p:spTree>
@@ -21051,7 +22762,11 @@
             </a:r>
             <a:r>
               <a:rPr lang="en-US" sz="1050" dirty="0"/>
-              <a:t>   106  Jason Roth</a:t>
+              <a:t>   106  Jason </a:t>
+            </a:r>
+            <a:r>
+              <a:rPr lang="en-US" sz="1050" dirty="0" smtClean="0"/>
+              <a:t>Roth…..</a:t>
             </a:r>
             <a:endParaRPr lang="en-US" sz="1050" dirty="0" smtClean="0">
               <a:gradFill>
@@ -21287,785 +23002,7 @@
 </p:sld>
 </file>
 
-<file path=ppt/slides/slide19.xml><?xml version="1.0" encoding="utf-8"?>
-<p:sld xmlns:a="http://schemas.openxmlformats.org/drawingml/2006/main" xmlns:r="http://schemas.openxmlformats.org/officeDocument/2006/relationships" xmlns:p="http://schemas.openxmlformats.org/presentationml/2006/main">
-  <p:cSld>
-    <p:spTree>
-      <p:nvGrpSpPr>
-        <p:cNvPr id="1" name=""/>
-        <p:cNvGrpSpPr/>
-        <p:nvPr/>
-      </p:nvGrpSpPr>
-      <p:grpSpPr>
-        <a:xfrm>
-          <a:off x="0" y="0"/>
-          <a:ext cx="0" cy="0"/>
-          <a:chOff x="0" y="0"/>
-          <a:chExt cx="0" cy="0"/>
-        </a:xfrm>
-      </p:grpSpPr>
-      <p:sp>
-        <p:nvSpPr>
-          <p:cNvPr id="2" name="Title 1"/>
-          <p:cNvSpPr>
-            <a:spLocks noGrp="1"/>
-          </p:cNvSpPr>
-          <p:nvPr>
-            <p:ph type="title"/>
-          </p:nvPr>
-        </p:nvSpPr>
-        <p:spPr>
-          <a:xfrm>
-            <a:off x="274638" y="2125662"/>
-            <a:ext cx="11887200" cy="2899255"/>
-          </a:xfrm>
-        </p:spPr>
-        <p:txBody>
-          <a:bodyPr/>
-          <a:lstStyle/>
-          <a:p>
-            <a:r>
-              <a:rPr lang="en-US" sz="1400" dirty="0"/>
-              <a:t>3966  Sebastian </a:t>
-            </a:r>
-            <a:r>
-              <a:rPr lang="en-US" sz="1400" dirty="0" err="1"/>
-              <a:t>Durandeu</a:t>
-            </a:r>
-            <a:r>
-              <a:rPr lang="en-US" sz="1400" dirty="0"/>
-              <a:t>  2830  Molly </a:t>
-            </a:r>
-            <a:r>
-              <a:rPr lang="en-US" sz="1400" dirty="0" err="1"/>
-              <a:t>Bostic</a:t>
-            </a:r>
-            <a:r>
-              <a:rPr lang="en-US" sz="1400" dirty="0"/>
-              <a:t>  2105  v-</a:t>
-            </a:r>
-            <a:r>
-              <a:rPr lang="en-US" sz="1400" dirty="0" err="1"/>
-              <a:t>aljenk</a:t>
-            </a:r>
-            <a:r>
-              <a:rPr lang="en-US" sz="1400" dirty="0"/>
-              <a:t>  1891  Dene Hager  1739  Jim Becker  1621  Tyson </a:t>
-            </a:r>
-            <a:r>
-              <a:rPr lang="en-US" sz="1400" dirty="0" err="1"/>
-              <a:t>Nevil</a:t>
-            </a:r>
-            <a:r>
-              <a:rPr lang="en-US" sz="1400" dirty="0"/>
-              <a:t>  1527  Ross McAllister  1279  C.J. </a:t>
-            </a:r>
-            <a:r>
-              <a:rPr lang="en-US" sz="1400" dirty="0" err="1"/>
-              <a:t>Gronlund</a:t>
-            </a:r>
-            <a:r>
-              <a:rPr lang="en-US" sz="1400" dirty="0"/>
-              <a:t>   961  unknown   751  ggailey777   741  Ty   678  Tom Dykstra   673  Larry Franks   668  </a:t>
-            </a:r>
-            <a:r>
-              <a:rPr lang="en-US" sz="1400" dirty="0" err="1"/>
-              <a:t>Sreedhar</a:t>
-            </a:r>
-            <a:r>
-              <a:rPr lang="en-US" sz="1400" dirty="0"/>
-              <a:t> </a:t>
-            </a:r>
-            <a:r>
-              <a:rPr lang="en-US" sz="1400" dirty="0" err="1"/>
-              <a:t>Pelluru</a:t>
-            </a:r>
-            <a:r>
-              <a:rPr lang="en-US" sz="1400" dirty="0"/>
-              <a:t>   570  David </a:t>
-            </a:r>
-            <a:r>
-              <a:rPr lang="en-US" sz="1400" dirty="0" err="1"/>
-              <a:t>Wrede</a:t>
-            </a:r>
-            <a:r>
-              <a:rPr lang="en-US" sz="1400" dirty="0"/>
-              <a:t>   524  </a:t>
-            </a:r>
-            <a:r>
-              <a:rPr lang="en-US" sz="1400" dirty="0" err="1"/>
-              <a:t>Jemash</a:t>
-            </a:r>
-            <a:r>
-              <a:rPr lang="en-US" sz="1400" dirty="0"/>
-              <a:t>   512  Monica Rush   431  </a:t>
-            </a:r>
-            <a:r>
-              <a:rPr lang="en-US" sz="1400" dirty="0" err="1"/>
-              <a:t>SharS</a:t>
-            </a:r>
-            <a:r>
-              <a:rPr lang="en-US" sz="1400" dirty="0"/>
-              <a:t>   418  Glenn </a:t>
-            </a:r>
-            <a:r>
-              <a:rPr lang="en-US" sz="1400" dirty="0" err="1"/>
-              <a:t>Gailey</a:t>
-            </a:r>
-            <a:r>
-              <a:rPr lang="en-US" sz="1400" dirty="0"/>
-              <a:t>   416  Andy Pasic   387  </a:t>
-            </a:r>
-            <a:r>
-              <a:rPr lang="en-US" sz="1400" dirty="0" err="1"/>
-              <a:t>pennij</a:t>
-            </a:r>
-            <a:r>
-              <a:rPr lang="en-US" sz="1400" dirty="0"/>
-              <a:t>   383  Tom </a:t>
-            </a:r>
-            <a:r>
-              <a:rPr lang="en-US" sz="1400" dirty="0" err="1"/>
-              <a:t>FitzMacken</a:t>
-            </a:r>
-            <a:r>
-              <a:rPr lang="en-US" sz="1400" dirty="0"/>
-              <a:t>   360  </a:t>
-            </a:r>
-            <a:r>
-              <a:rPr lang="en-US" sz="1400" dirty="0" err="1"/>
-              <a:t>CherylMc</a:t>
-            </a:r>
-            <a:r>
-              <a:rPr lang="en-US" sz="1400" dirty="0"/>
-              <a:t>   351  Matt LaBelle   316  Ralph </a:t>
-            </a:r>
-            <a:r>
-              <a:rPr lang="en-US" sz="1400" dirty="0" err="1"/>
-              <a:t>Squillace</a:t>
-            </a:r>
-            <a:r>
-              <a:rPr lang="en-US" sz="1400" dirty="0"/>
-              <a:t>   312  Carolyn </a:t>
-            </a:r>
-            <a:r>
-              <a:rPr lang="en-US" sz="1400" dirty="0" err="1"/>
-              <a:t>Gronlund</a:t>
-            </a:r>
-            <a:r>
-              <a:rPr lang="en-US" sz="1400" dirty="0"/>
-              <a:t>   305  Kathy Davies   286  </a:t>
-            </a:r>
-            <a:r>
-              <a:rPr lang="en-US" sz="1400" dirty="0" err="1"/>
-              <a:t>ShawnJackson</a:t>
-            </a:r>
-            <a:r>
-              <a:rPr lang="en-US" sz="1400" dirty="0"/>
-              <a:t>   284  Bryan </a:t>
-            </a:r>
-            <a:r>
-              <a:rPr lang="en-US" sz="1400" dirty="0" err="1"/>
-              <a:t>Lamos</a:t>
-            </a:r>
-            <a:r>
-              <a:rPr lang="en-US" sz="1400" dirty="0"/>
-              <a:t>   279  </a:t>
-            </a:r>
-            <a:r>
-              <a:rPr lang="en-US" sz="1400" dirty="0" err="1"/>
-              <a:t>Juliako</a:t>
-            </a:r>
-            <a:r>
-              <a:rPr lang="en-US" sz="1400" dirty="0"/>
-              <a:t>   276  Walter </a:t>
-            </a:r>
-            <a:r>
-              <a:rPr lang="en-US" sz="1400" dirty="0" err="1"/>
-              <a:t>Poupore</a:t>
-            </a:r>
-            <a:r>
-              <a:rPr lang="en-US" sz="1400" dirty="0"/>
-              <a:t> (Microsoft)   273  Joao </a:t>
-            </a:r>
-            <a:r>
-              <a:rPr lang="en-US" sz="1400" dirty="0" err="1"/>
-              <a:t>Madureira</a:t>
-            </a:r>
-            <a:r>
-              <a:rPr lang="en-US" sz="1400" dirty="0"/>
-              <a:t>   272  </a:t>
-            </a:r>
-            <a:r>
-              <a:rPr lang="en-US" sz="1400" dirty="0" err="1"/>
-              <a:t>jimbe</a:t>
-            </a:r>
-            <a:r>
-              <a:rPr lang="en-US" sz="1400" dirty="0"/>
-              <a:t>   271  </a:t>
-            </a:r>
-            <a:r>
-              <a:rPr lang="en-US" sz="1400" dirty="0" err="1"/>
-              <a:t>davidwrede</a:t>
-            </a:r>
-            <a:r>
-              <a:rPr lang="en-US" sz="1400" dirty="0"/>
-              <a:t>   271  </a:t>
-            </a:r>
-            <a:r>
-              <a:rPr lang="en-US" sz="1400" dirty="0" err="1"/>
-              <a:t>Tamra</a:t>
-            </a:r>
-            <a:r>
-              <a:rPr lang="en-US" sz="1400" dirty="0"/>
-              <a:t> Myers   269  Alan Cameron Wills   265  </a:t>
-            </a:r>
-            <a:r>
-              <a:rPr lang="en-US" sz="1400" dirty="0" err="1"/>
-              <a:t>cherylmc</a:t>
-            </a:r>
-            <a:r>
-              <a:rPr lang="en-US" sz="1400" dirty="0"/>
-              <a:t>   264  Brian Swan   257  Jonathan Gao   242  Gary Ericson   236  </a:t>
-            </a:r>
-            <a:r>
-              <a:rPr lang="en-US" sz="1400" dirty="0" err="1"/>
-              <a:t>HeidiSteen</a:t>
-            </a:r>
-            <a:r>
-              <a:rPr lang="en-US" sz="1400" dirty="0"/>
-              <a:t>   236  Bill </a:t>
-            </a:r>
-            <a:r>
-              <a:rPr lang="en-US" sz="1400" dirty="0" err="1"/>
-              <a:t>Mathers</a:t>
-            </a:r>
-            <a:r>
-              <a:rPr lang="en-US" sz="1400" dirty="0"/>
-              <a:t>   235  Seth Manheim   230  Steve Stein   228  Andy (</a:t>
-            </a:r>
-            <a:r>
-              <a:rPr lang="en-US" sz="1400" dirty="0" err="1"/>
-              <a:t>adegeo</a:t>
-            </a:r>
-            <a:r>
-              <a:rPr lang="en-US" sz="1400" dirty="0"/>
-              <a:t>)   226  Jeff Stokes   224  </a:t>
-            </a:r>
-            <a:r>
-              <a:rPr lang="en-US" sz="1400" dirty="0" err="1"/>
-              <a:t>Alpa</a:t>
-            </a:r>
-            <a:r>
-              <a:rPr lang="en-US" sz="1400" dirty="0"/>
-              <a:t> </a:t>
-            </a:r>
-            <a:r>
-              <a:rPr lang="en-US" sz="1400" dirty="0" err="1"/>
-              <a:t>Kohli</a:t>
-            </a:r>
-            <a:r>
-              <a:rPr lang="en-US" sz="1400" dirty="0"/>
-              <a:t>   221  Dan </a:t>
-            </a:r>
-            <a:r>
-              <a:rPr lang="en-US" sz="1400" dirty="0" err="1"/>
-              <a:t>Lepow</a:t>
-            </a:r>
-            <a:r>
-              <a:rPr lang="en-US" sz="1400" dirty="0"/>
-              <a:t>   217  </a:t>
-            </a:r>
-            <a:r>
-              <a:rPr lang="en-US" sz="1400" dirty="0" err="1"/>
-              <a:t>tysonn</a:t>
-            </a:r>
-            <a:r>
-              <a:rPr lang="en-US" sz="1400" dirty="0"/>
-              <a:t>   217  Steve Danielson   217  Ryan </a:t>
-            </a:r>
-            <a:r>
-              <a:rPr lang="en-US" sz="1400" dirty="0" err="1"/>
-              <a:t>Wike</a:t>
-            </a:r>
-            <a:r>
-              <a:rPr lang="en-US" sz="1400" dirty="0"/>
-              <a:t>   209  Katie Griffith   207  </a:t>
-            </a:r>
-            <a:r>
-              <a:rPr lang="en-US" sz="1400" dirty="0" err="1"/>
-              <a:t>Blackmist</a:t>
-            </a:r>
-            <a:r>
-              <a:rPr lang="en-US" sz="1400" dirty="0"/>
-              <a:t>   206  </a:t>
-            </a:r>
-            <a:r>
-              <a:rPr lang="en-US" sz="1400" dirty="0" err="1"/>
-              <a:t>Penni</a:t>
-            </a:r>
-            <a:r>
-              <a:rPr lang="en-US" sz="1400" dirty="0"/>
-              <a:t> Johnson   190  v-</a:t>
-            </a:r>
-            <a:r>
-              <a:rPr lang="en-US" sz="1400" dirty="0" err="1"/>
-              <a:t>kagri</a:t>
-            </a:r>
-            <a:r>
-              <a:rPr lang="en-US" sz="1400" dirty="0"/>
-              <a:t>   188  </a:t>
-            </a:r>
-            <a:r>
-              <a:rPr lang="en-US" sz="1400" dirty="0" err="1"/>
-              <a:t>cephalin</a:t>
-            </a:r>
-            <a:r>
-              <a:rPr lang="en-US" sz="1400" dirty="0"/>
-              <a:t>   186  Matthew Henderson   185  Alma Jenks   183  </a:t>
-            </a:r>
-            <a:r>
-              <a:rPr lang="en-US" sz="1400" dirty="0" err="1"/>
-              <a:t>deneha</a:t>
-            </a:r>
-            <a:r>
-              <a:rPr lang="en-US" sz="1400" dirty="0"/>
-              <a:t>   182  Curtis Love   177  </a:t>
-            </a:r>
-            <a:r>
-              <a:rPr lang="en-US" sz="1400" dirty="0" err="1"/>
-              <a:t>mimig</a:t>
-            </a:r>
-            <a:r>
-              <a:rPr lang="en-US" sz="1400" dirty="0"/>
-              <a:t>   168  Sigrid </a:t>
-            </a:r>
-            <a:r>
-              <a:rPr lang="en-US" sz="1400" dirty="0" err="1"/>
-              <a:t>Elenga</a:t>
-            </a:r>
-            <a:r>
-              <a:rPr lang="en-US" sz="1400" dirty="0"/>
-              <a:t>   160  </a:t>
-            </a:r>
-            <a:r>
-              <a:rPr lang="en-US" sz="1400" dirty="0" err="1"/>
-              <a:t>bradsev</a:t>
-            </a:r>
-            <a:r>
-              <a:rPr lang="en-US" sz="1400" dirty="0"/>
-              <a:t>   157  pcw3187   157  </a:t>
-            </a:r>
-            <a:r>
-              <a:rPr lang="en-US" sz="1400" dirty="0" err="1"/>
-              <a:t>Dhanashri</a:t>
-            </a:r>
-            <a:r>
-              <a:rPr lang="en-US" sz="1400" dirty="0"/>
-              <a:t> </a:t>
-            </a:r>
-            <a:r>
-              <a:rPr lang="en-US" sz="1400" dirty="0" err="1"/>
-              <a:t>Kshirsagar</a:t>
-            </a:r>
-            <a:r>
-              <a:rPr lang="en-US" sz="1400" dirty="0"/>
-              <a:t>   155  Tom Archer   155  </a:t>
-            </a:r>
-            <a:r>
-              <a:rPr lang="en-US" sz="1400" dirty="0" err="1"/>
-              <a:t>RickSaling</a:t>
-            </a:r>
-            <a:r>
-              <a:rPr lang="en-US" sz="1400" dirty="0"/>
-              <a:t>   149  Jim-Parker   146  </a:t>
-            </a:r>
-            <a:r>
-              <a:rPr lang="en-US" sz="1400" dirty="0" err="1"/>
-              <a:t>barbkess</a:t>
-            </a:r>
-            <a:r>
-              <a:rPr lang="en-US" sz="1400" dirty="0"/>
-              <a:t>   144  </a:t>
-            </a:r>
-            <a:r>
-              <a:rPr lang="en-US" sz="1400" dirty="0" err="1"/>
-              <a:t>Joost</a:t>
-            </a:r>
-            <a:r>
-              <a:rPr lang="en-US" sz="1400" dirty="0"/>
-              <a:t> de </a:t>
-            </a:r>
-            <a:r>
-              <a:rPr lang="en-US" sz="1400" dirty="0" err="1"/>
-              <a:t>Nijs</a:t>
-            </a:r>
-            <a:r>
-              <a:rPr lang="en-US" sz="1400" dirty="0"/>
-              <a:t>   142  Patrick </a:t>
-            </a:r>
-            <a:r>
-              <a:rPr lang="en-US" sz="1400" dirty="0" err="1"/>
-              <a:t>Sheahan</a:t>
-            </a:r>
-            <a:r>
-              <a:rPr lang="en-US" sz="1400" dirty="0"/>
-              <a:t>   139  </a:t>
-            </a:r>
-            <a:r>
-              <a:rPr lang="en-US" sz="1400" dirty="0" err="1"/>
-              <a:t>krisragh</a:t>
-            </a:r>
-            <a:r>
-              <a:rPr lang="en-US" sz="1400" dirty="0"/>
-              <a:t>   139  Erik </a:t>
-            </a:r>
-            <a:r>
-              <a:rPr lang="en-US" sz="1400" dirty="0" err="1"/>
-              <a:t>Reitan</a:t>
-            </a:r>
-            <a:r>
-              <a:rPr lang="en-US" sz="1400" dirty="0"/>
-              <a:t>   138  </a:t>
-            </a:r>
-            <a:r>
-              <a:rPr lang="en-US" sz="1400" dirty="0" err="1"/>
-              <a:t>sidneyh</a:t>
-            </a:r>
-            <a:r>
-              <a:rPr lang="en-US" sz="1400" dirty="0"/>
-              <a:t>   136  </a:t>
-            </a:r>
-            <a:r>
-              <a:rPr lang="en-US" sz="1400" dirty="0" err="1"/>
-              <a:t>ghogen</a:t>
-            </a:r>
-            <a:r>
-              <a:rPr lang="en-US" sz="1400" dirty="0"/>
-              <a:t>   135  </a:t>
-            </a:r>
-            <a:r>
-              <a:rPr lang="en-US" sz="1400" dirty="0" err="1"/>
-              <a:t>mattshel</a:t>
-            </a:r>
-            <a:r>
-              <a:rPr lang="en-US" sz="1400" dirty="0"/>
-              <a:t>   135  </a:t>
-            </a:r>
-            <a:r>
-              <a:rPr lang="en-US" sz="1400" dirty="0" err="1"/>
-              <a:t>GeneMi-MightyPen</a:t>
-            </a:r>
-            <a:r>
-              <a:rPr lang="en-US" sz="1400" dirty="0"/>
-              <a:t>   131  jeffstokes72   130  Donna </a:t>
-            </a:r>
-            <a:r>
-              <a:rPr lang="en-US" sz="1400" dirty="0" err="1"/>
-              <a:t>Malayeri</a:t>
-            </a:r>
-            <a:r>
-              <a:rPr lang="en-US" sz="1400" dirty="0"/>
-              <a:t>   128  </a:t>
-            </a:r>
-            <a:r>
-              <a:rPr lang="en-US" sz="1400" dirty="0" err="1"/>
-              <a:t>curtand</a:t>
-            </a:r>
-            <a:r>
-              <a:rPr lang="en-US" sz="1400" dirty="0"/>
-              <a:t>   125  Bill Anderson   122  </a:t>
-            </a:r>
-            <a:r>
-              <a:rPr lang="en-US" sz="1400" dirty="0" err="1"/>
-              <a:t>Telmo</a:t>
-            </a:r>
-            <a:r>
-              <a:rPr lang="en-US" sz="1400" dirty="0"/>
-              <a:t> </a:t>
-            </a:r>
-            <a:r>
-              <a:rPr lang="en-US" sz="1400" dirty="0" err="1"/>
-              <a:t>Sampaio</a:t>
-            </a:r>
-            <a:r>
-              <a:rPr lang="en-US" sz="1400" dirty="0"/>
-              <a:t>   120  </a:t>
-            </a:r>
-            <a:r>
-              <a:rPr lang="en-US" sz="1400" dirty="0" err="1"/>
-              <a:t>tfitzmac</a:t>
-            </a:r>
-            <a:r>
-              <a:rPr lang="en-US" sz="1400" dirty="0"/>
-              <a:t>   119  Mimi Xu   117  Brian Wren   115  v-</a:t>
-            </a:r>
-            <a:r>
-              <a:rPr lang="en-US" sz="1400" dirty="0" err="1"/>
-              <a:t>lincan</a:t>
-            </a:r>
-            <a:r>
-              <a:rPr lang="en-US" sz="1400" dirty="0"/>
-              <a:t>   113  Stephen </a:t>
-            </a:r>
-            <a:r>
-              <a:rPr lang="en-US" sz="1400" dirty="0" err="1"/>
-              <a:t>Siciliano</a:t>
-            </a:r>
-            <a:r>
-              <a:rPr lang="en-US" sz="1400" dirty="0"/>
-              <a:t>   111  </a:t>
-            </a:r>
-            <a:r>
-              <a:rPr lang="en-US" sz="1400" dirty="0" err="1"/>
-              <a:t>jessebenson</a:t>
-            </a:r>
-            <a:r>
-              <a:rPr lang="en-US" sz="1400" dirty="0"/>
-              <a:t>   110  Ken Hoff   109  Christopher Anderson   108  Liza </a:t>
-            </a:r>
-            <a:r>
-              <a:rPr lang="en-US" sz="1400" dirty="0" err="1"/>
-              <a:t>Poggemeyer</a:t>
-            </a:r>
-            <a:r>
-              <a:rPr lang="en-US" sz="1400" dirty="0"/>
-              <a:t>   106  Jason </a:t>
-            </a:r>
-            <a:r>
-              <a:rPr lang="en-US" sz="1400" dirty="0" smtClean="0"/>
-              <a:t>Roth</a:t>
-            </a:r>
-            <a:br>
-              <a:rPr lang="en-US" sz="1400" dirty="0" smtClean="0"/>
-            </a:br>
-            <a:r>
-              <a:rPr lang="en-US" sz="1400" dirty="0"/>
-              <a:t/>
-            </a:r>
-            <a:br>
-              <a:rPr lang="en-US" sz="1400" dirty="0"/>
-            </a:br>
-            <a:r>
-              <a:rPr lang="en-US" sz="1400" dirty="0" smtClean="0"/>
-              <a:t/>
-            </a:r>
-            <a:br>
-              <a:rPr lang="en-US" sz="1400" dirty="0" smtClean="0"/>
-            </a:br>
-            <a:r>
-              <a:rPr lang="en-US" sz="1400" dirty="0"/>
-              <a:t/>
-            </a:r>
-            <a:br>
-              <a:rPr lang="en-US" sz="1400" dirty="0"/>
-            </a:br>
-            <a:r>
-              <a:rPr lang="en-US" sz="1400" dirty="0"/>
-              <a:t> ╭─</a:t>
-            </a:r>
-            <a:r>
-              <a:rPr lang="en-US" sz="1400" dirty="0" err="1"/>
-              <a:t>rasquill@macbookpro</a:t>
-            </a:r>
-            <a:r>
-              <a:rPr lang="en-US" sz="1400" dirty="0"/>
-              <a:t>  ~/workspace/azure-content-</a:t>
-            </a:r>
-            <a:r>
-              <a:rPr lang="en-US" sz="1400" dirty="0" err="1"/>
-              <a:t>pr</a:t>
-            </a:r>
-            <a:r>
-              <a:rPr lang="en-US" sz="1400" dirty="0"/>
-              <a:t>/articles/virtual-machines  ‹master›╰─$ </a:t>
-            </a:r>
-            <a:r>
-              <a:rPr lang="en-US" sz="1400" dirty="0" err="1"/>
-              <a:t>git</a:t>
-            </a:r>
-            <a:r>
-              <a:rPr lang="en-US" sz="1400" dirty="0"/>
-              <a:t> </a:t>
-            </a:r>
-            <a:r>
-              <a:rPr lang="en-US" sz="1400" dirty="0" err="1"/>
-              <a:t>shortlog</a:t>
-            </a:r>
-            <a:r>
-              <a:rPr lang="en-US" sz="1400" dirty="0"/>
-              <a:t> -s | </a:t>
-            </a:r>
-            <a:r>
-              <a:rPr lang="en-US" sz="1400" dirty="0" err="1"/>
-              <a:t>wc</a:t>
-            </a:r>
-            <a:r>
-              <a:rPr lang="en-US" sz="1400" dirty="0"/>
-              <a:t> -l    </a:t>
-            </a:r>
-            <a:r>
-              <a:rPr lang="en-US" sz="1400" dirty="0" smtClean="0"/>
-              <a:t/>
-            </a:r>
-            <a:br>
-              <a:rPr lang="en-US" sz="1400" dirty="0" smtClean="0"/>
-            </a:br>
-            <a:r>
-              <a:rPr lang="en-US" sz="1400" dirty="0" smtClean="0"/>
-              <a:t>1036</a:t>
-            </a:r>
-            <a:endParaRPr lang="en-US" sz="1400" dirty="0"/>
-          </a:p>
-        </p:txBody>
-      </p:sp>
-    </p:spTree>
-    <p:extLst>
-      <p:ext uri="{BB962C8B-B14F-4D97-AF65-F5344CB8AC3E}">
-        <p14:creationId xmlns:p14="http://schemas.microsoft.com/office/powerpoint/2010/main" val="951617872"/>
-      </p:ext>
-    </p:extLst>
-  </p:cSld>
-  <p:clrMapOvr>
-    <a:masterClrMapping/>
-  </p:clrMapOvr>
-  <mc:AlternateContent xmlns:mc="http://schemas.openxmlformats.org/markup-compatibility/2006">
-    <mc:Choice xmlns:p14="http://schemas.microsoft.com/office/powerpoint/2010/main" Requires="p14">
-      <p:transition spd="med" p14:dur="700">
-        <p:fade/>
-      </p:transition>
-    </mc:Choice>
-    <mc:Fallback>
-      <p:transition spd="med">
-        <p:fade/>
-      </p:transition>
-    </mc:Fallback>
-  </mc:AlternateContent>
-  <p:timing>
-    <p:tnLst>
-      <p:par>
-        <p:cTn id="1" dur="indefinite" restart="never" nodeType="tmRoot"/>
-      </p:par>
-    </p:tnLst>
-  </p:timing>
-</p:sld>
-</file>
-
-<file path=ppt/slides/slide2.xml><?xml version="1.0" encoding="utf-8"?>
-<p:sld xmlns:a="http://schemas.openxmlformats.org/drawingml/2006/main" xmlns:r="http://schemas.openxmlformats.org/officeDocument/2006/relationships" xmlns:p="http://schemas.openxmlformats.org/presentationml/2006/main">
-  <p:cSld>
-    <p:spTree>
-      <p:nvGrpSpPr>
-        <p:cNvPr id="1" name=""/>
-        <p:cNvGrpSpPr/>
-        <p:nvPr/>
-      </p:nvGrpSpPr>
-      <p:grpSpPr>
-        <a:xfrm>
-          <a:off x="0" y="0"/>
-          <a:ext cx="0" cy="0"/>
-          <a:chOff x="0" y="0"/>
-          <a:chExt cx="0" cy="0"/>
-        </a:xfrm>
-      </p:grpSpPr>
-      <p:sp>
-        <p:nvSpPr>
-          <p:cNvPr id="4" name="Title 3"/>
-          <p:cNvSpPr>
-            <a:spLocks noGrp="1"/>
-          </p:cNvSpPr>
-          <p:nvPr>
-            <p:ph type="title"/>
-          </p:nvPr>
-        </p:nvSpPr>
-        <p:spPr/>
-        <p:txBody>
-          <a:bodyPr/>
-          <a:lstStyle/>
-          <a:p>
-            <a:r>
-              <a:rPr lang="en-US" dirty="0" smtClean="0"/>
-              <a:t>Presentation title</a:t>
-            </a:r>
-            <a:br>
-              <a:rPr lang="en-US" dirty="0" smtClean="0"/>
-            </a:br>
-            <a:r>
-              <a:rPr lang="en-US" dirty="0" smtClean="0"/>
-              <a:t>goes here</a:t>
-            </a:r>
-            <a:endParaRPr lang="en-US" dirty="0"/>
-          </a:p>
-        </p:txBody>
-      </p:sp>
-      <p:sp>
-        <p:nvSpPr>
-          <p:cNvPr id="5" name="Text Placeholder 4"/>
-          <p:cNvSpPr>
-            <a:spLocks noGrp="1"/>
-          </p:cNvSpPr>
-          <p:nvPr>
-            <p:ph type="body" sz="quarter" idx="14"/>
-          </p:nvPr>
-        </p:nvSpPr>
-        <p:spPr/>
-        <p:txBody>
-          <a:bodyPr/>
-          <a:lstStyle/>
-          <a:p>
-            <a:r>
-              <a:rPr lang="en-US" dirty="0" smtClean="0"/>
-              <a:t>Speaker Name</a:t>
-            </a:r>
-          </a:p>
-          <a:p>
-            <a:r>
-              <a:rPr lang="en-US" dirty="0" smtClean="0"/>
-              <a:t>Title</a:t>
-            </a:r>
-          </a:p>
-          <a:p>
-            <a:r>
-              <a:rPr lang="en-US" dirty="0" smtClean="0"/>
-              <a:t>Microsoft IT</a:t>
-            </a:r>
-            <a:endParaRPr lang="en-US" dirty="0"/>
-          </a:p>
-        </p:txBody>
-      </p:sp>
-    </p:spTree>
-    <p:extLst>
-      <p:ext uri="{BB962C8B-B14F-4D97-AF65-F5344CB8AC3E}">
-        <p14:creationId xmlns:p14="http://schemas.microsoft.com/office/powerpoint/2010/main" val="3975204317"/>
-      </p:ext>
-    </p:extLst>
-  </p:cSld>
-  <p:clrMapOvr>
-    <a:masterClrMapping/>
-  </p:clrMapOvr>
-  <mc:AlternateContent xmlns:mc="http://schemas.openxmlformats.org/markup-compatibility/2006" xmlns:p14="http://schemas.microsoft.com/office/powerpoint/2010/main">
-    <mc:Choice Requires="p14">
-      <p:transition spd="med" p14:dur="700">
-        <p:fade/>
-      </p:transition>
-    </mc:Choice>
-    <mc:Fallback xmlns="">
-      <p:transition spd="med">
-        <p:fade/>
-      </p:transition>
-    </mc:Fallback>
-  </mc:AlternateContent>
-  <p:timing>
-    <p:tnLst>
-      <p:par>
-        <p:cTn id="1" dur="indefinite" restart="never" nodeType="tmRoot"/>
-      </p:par>
-    </p:tnLst>
-  </p:timing>
-</p:sld>
-</file>
-
-<file path=ppt/slides/slide20.xml><?xml version="1.0" encoding="utf-8"?>
+<file path=ppt/slides/slide23.xml><?xml version="1.0" encoding="utf-8"?>
 <p:sld xmlns:a="http://schemas.openxmlformats.org/drawingml/2006/main" xmlns:r="http://schemas.openxmlformats.org/officeDocument/2006/relationships" xmlns:p="http://schemas.openxmlformats.org/presentationml/2006/main">
   <p:cSld>
     <p:spTree>
@@ -22137,7 +23074,7 @@
 </p:sld>
 </file>
 
-<file path=ppt/slides/slide21.xml><?xml version="1.0" encoding="utf-8"?>
+<file path=ppt/slides/slide24.xml><?xml version="1.0" encoding="utf-8"?>
 <p:sld xmlns:a="http://schemas.openxmlformats.org/drawingml/2006/main" xmlns:r="http://schemas.openxmlformats.org/officeDocument/2006/relationships" xmlns:p="http://schemas.openxmlformats.org/presentationml/2006/main">
   <p:cSld>
     <p:spTree>
@@ -22209,7 +23146,7 @@
 </p:sld>
 </file>
 
-<file path=ppt/slides/slide22.xml><?xml version="1.0" encoding="utf-8"?>
+<file path=ppt/slides/slide25.xml><?xml version="1.0" encoding="utf-8"?>
 <p:sld xmlns:a="http://schemas.openxmlformats.org/drawingml/2006/main" xmlns:r="http://schemas.openxmlformats.org/officeDocument/2006/relationships" xmlns:p="http://schemas.openxmlformats.org/presentationml/2006/main">
   <p:cSld>
     <p:spTree>
@@ -22354,7 +23291,7 @@
 </p:sld>
 </file>
 
-<file path=ppt/slides/slide23.xml><?xml version="1.0" encoding="utf-8"?>
+<file path=ppt/slides/slide26.xml><?xml version="1.0" encoding="utf-8"?>
 <p:sld xmlns:a="http://schemas.openxmlformats.org/drawingml/2006/main" xmlns:r="http://schemas.openxmlformats.org/officeDocument/2006/relationships" xmlns:p="http://schemas.openxmlformats.org/presentationml/2006/main">
   <p:cSld>
     <p:spTree>
@@ -22449,7 +23386,7 @@
 </p:sld>
 </file>
 
-<file path=ppt/slides/slide24.xml><?xml version="1.0" encoding="utf-8"?>
+<file path=ppt/slides/slide27.xml><?xml version="1.0" encoding="utf-8"?>
 <p:sld xmlns:a="http://schemas.openxmlformats.org/drawingml/2006/main" xmlns:r="http://schemas.openxmlformats.org/officeDocument/2006/relationships" xmlns:p="http://schemas.openxmlformats.org/presentationml/2006/main">
   <p:cSld>
     <p:spTree>
@@ -22544,7 +23481,7 @@
 </p:sld>
 </file>
 
-<file path=ppt/slides/slide25.xml><?xml version="1.0" encoding="utf-8"?>
+<file path=ppt/slides/slide28.xml><?xml version="1.0" encoding="utf-8"?>
 <p:sld xmlns:a="http://schemas.openxmlformats.org/drawingml/2006/main" xmlns:r="http://schemas.openxmlformats.org/officeDocument/2006/relationships" xmlns:p="http://schemas.openxmlformats.org/presentationml/2006/main" show="0">
   <p:cSld>
     <p:spTree>
@@ -22668,7 +23605,7 @@
 </p:sld>
 </file>
 
-<file path=ppt/slides/slide26.xml><?xml version="1.0" encoding="utf-8"?>
+<file path=ppt/slides/slide29.xml><?xml version="1.0" encoding="utf-8"?>
 <p:sld xmlns:a="http://schemas.openxmlformats.org/drawingml/2006/main" xmlns:r="http://schemas.openxmlformats.org/officeDocument/2006/relationships" xmlns:p="http://schemas.openxmlformats.org/presentationml/2006/main">
   <p:cSld>
     <p:spTree>

</xml_diff>